<commit_message>
Updated the PEG ppt
</commit_message>
<xml_diff>
--- a/Show & Tell/Process Engineering Group_ppt.pptx
+++ b/Show & Tell/Process Engineering Group_ppt.pptx
@@ -209,10 +209,10 @@
           </a:lstStyle>
           <a:p>
             <a:r>
-              <a:rPr lang="en-US" smtClean="0"/>
+              <a:rPr lang="en-US" dirty="0" smtClean="0"/>
               <a:t>PEG</a:t>
             </a:r>
-            <a:endParaRPr lang="en-US"/>
+            <a:endParaRPr lang="en-US" dirty="0"/>
           </a:p>
         </p:txBody>
       </p:sp>
@@ -246,9 +246,9 @@
             <a:fld id="{28B68012-8E42-4A1D-B48A-D791EB074016}" type="datetimeFigureOut">
               <a:rPr lang="en-US" smtClean="0"/>
               <a:pPr/>
-              <a:t>10/28/2022</a:t>
+              <a:t>10/29/2022</a:t>
             </a:fld>
-            <a:endParaRPr lang="en-US"/>
+            <a:endParaRPr lang="en-US" dirty="0"/>
           </a:p>
         </p:txBody>
       </p:sp>
@@ -279,7 +279,7 @@
             </a:lvl1pPr>
           </a:lstStyle>
           <a:p>
-            <a:endParaRPr lang="en-US"/>
+            <a:endParaRPr lang="en-US" dirty="0"/>
           </a:p>
         </p:txBody>
       </p:sp>
@@ -315,7 +315,7 @@
               <a:pPr/>
               <a:t>‹#›</a:t>
             </a:fld>
-            <a:endParaRPr lang="en-US"/>
+            <a:endParaRPr lang="en-US" dirty="0"/>
           </a:p>
         </p:txBody>
       </p:sp>
@@ -381,10 +381,10 @@
           </a:lstStyle>
           <a:p>
             <a:r>
-              <a:rPr lang="en-US" smtClean="0"/>
+              <a:rPr lang="en-US" dirty="0" smtClean="0"/>
               <a:t>PEG</a:t>
             </a:r>
-            <a:endParaRPr lang="en-US"/>
+            <a:endParaRPr lang="en-US" dirty="0"/>
           </a:p>
         </p:txBody>
       </p:sp>
@@ -418,9 +418,9 @@
             <a:fld id="{C9D77161-5417-4A31-87B2-69C7C906B48B}" type="datetimeFigureOut">
               <a:rPr lang="en-US" smtClean="0"/>
               <a:pPr/>
-              <a:t>10/28/2022</a:t>
+              <a:t>10/29/2022</a:t>
             </a:fld>
-            <a:endParaRPr lang="en-US"/>
+            <a:endParaRPr lang="en-US" dirty="0"/>
           </a:p>
         </p:txBody>
       </p:sp>
@@ -453,7 +453,7 @@
           <a:bodyPr vert="horz" lIns="94933" tIns="47467" rIns="94933" bIns="47467" rtlCol="0" anchor="ctr"/>
           <a:lstStyle/>
           <a:p>
-            <a:endParaRPr lang="en-US"/>
+            <a:endParaRPr lang="en-US" dirty="0"/>
           </a:p>
         </p:txBody>
       </p:sp>
@@ -544,7 +544,7 @@
             </a:lvl1pPr>
           </a:lstStyle>
           <a:p>
-            <a:endParaRPr lang="en-US"/>
+            <a:endParaRPr lang="en-US" dirty="0"/>
           </a:p>
         </p:txBody>
       </p:sp>
@@ -580,7 +580,7 @@
               <a:pPr/>
               <a:t>‹#›</a:t>
             </a:fld>
-            <a:endParaRPr lang="en-US"/>
+            <a:endParaRPr lang="en-US" dirty="0"/>
           </a:p>
         </p:txBody>
       </p:sp>
@@ -756,7 +756,7 @@
               <a:pPr/>
               <a:t>1</a:t>
             </a:fld>
-            <a:endParaRPr lang="en-US"/>
+            <a:endParaRPr lang="en-US" dirty="0"/>
           </a:p>
         </p:txBody>
       </p:sp>
@@ -776,10 +776,10 @@
           <a:lstStyle/>
           <a:p>
             <a:r>
-              <a:rPr lang="en-US" smtClean="0"/>
+              <a:rPr lang="en-US" dirty="0" smtClean="0"/>
               <a:t>PEG</a:t>
             </a:r>
-            <a:endParaRPr lang="en-US"/>
+            <a:endParaRPr lang="en-US" dirty="0"/>
           </a:p>
         </p:txBody>
       </p:sp>
@@ -857,49 +857,30 @@
               <a:tabLst/>
               <a:defRPr/>
             </a:pPr>
+            <a:endParaRPr lang="en-IN" dirty="0"/>
+          </a:p>
+        </p:txBody>
+      </p:sp>
+      <p:sp>
+        <p:nvSpPr>
+          <p:cNvPr id="4" name="Header Placeholder 3"/>
+          <p:cNvSpPr>
+            <a:spLocks noGrp="1"/>
+          </p:cNvSpPr>
+          <p:nvPr>
+            <p:ph type="hdr" sz="quarter" idx="10"/>
+          </p:nvPr>
+        </p:nvSpPr>
+        <p:spPr/>
+        <p:txBody>
+          <a:bodyPr/>
+          <a:lstStyle/>
+          <a:p>
             <a:r>
               <a:rPr lang="en-US" dirty="0" smtClean="0"/>
-              <a:t>Lifecycle model decided</a:t>
-            </a:r>
-            <a:r>
-              <a:rPr lang="en-US" baseline="0" dirty="0" smtClean="0"/>
-              <a:t> and mentioned in tailoring guideline : Waterfall (OPD SP1.2)</a:t>
-            </a:r>
-            <a:endParaRPr lang="en-IN" dirty="0" smtClean="0"/>
-          </a:p>
-          <a:p>
-            <a:r>
-              <a:rPr lang="en-US" dirty="0" smtClean="0"/>
-              <a:t>Tailoring guidelines to create</a:t>
-            </a:r>
-            <a:r>
-              <a:rPr lang="en-US" baseline="0" dirty="0" smtClean="0"/>
-              <a:t> project defined process. (OPD SP 1.3)</a:t>
-            </a:r>
-            <a:endParaRPr lang="en-IN" dirty="0"/>
-          </a:p>
-        </p:txBody>
-      </p:sp>
-      <p:sp>
-        <p:nvSpPr>
-          <p:cNvPr id="4" name="Header Placeholder 3"/>
-          <p:cNvSpPr>
-            <a:spLocks noGrp="1"/>
-          </p:cNvSpPr>
-          <p:nvPr>
-            <p:ph type="hdr" sz="quarter" idx="10"/>
-          </p:nvPr>
-        </p:nvSpPr>
-        <p:spPr/>
-        <p:txBody>
-          <a:bodyPr/>
-          <a:lstStyle/>
-          <a:p>
-            <a:r>
-              <a:rPr lang="en-US" smtClean="0"/>
               <a:t>PEG</a:t>
             </a:r>
-            <a:endParaRPr lang="en-US"/>
+            <a:endParaRPr lang="en-US" dirty="0"/>
           </a:p>
         </p:txBody>
       </p:sp>
@@ -923,7 +904,7 @@
               <a:pPr/>
               <a:t>11</a:t>
             </a:fld>
-            <a:endParaRPr lang="en-US"/>
+            <a:endParaRPr lang="en-US" dirty="0"/>
           </a:p>
         </p:txBody>
       </p:sp>
@@ -984,44 +965,30 @@
           <a:bodyPr/>
           <a:lstStyle/>
           <a:p>
+            <a:endParaRPr lang="en-IN" dirty="0"/>
+          </a:p>
+        </p:txBody>
+      </p:sp>
+      <p:sp>
+        <p:nvSpPr>
+          <p:cNvPr id="4" name="Header Placeholder 3"/>
+          <p:cNvSpPr>
+            <a:spLocks noGrp="1"/>
+          </p:cNvSpPr>
+          <p:nvPr>
+            <p:ph type="hdr" sz="quarter" idx="10"/>
+          </p:nvPr>
+        </p:nvSpPr>
+        <p:spPr/>
+        <p:txBody>
+          <a:bodyPr/>
+          <a:lstStyle/>
+          <a:p>
             <a:r>
               <a:rPr lang="en-US" dirty="0" smtClean="0"/>
-              <a:t>OPD SP 1.6 :</a:t>
-            </a:r>
-          </a:p>
-          <a:p>
-            <a:r>
-              <a:rPr lang="en-US" dirty="0" smtClean="0"/>
-              <a:t>Generic work environment</a:t>
-            </a:r>
-            <a:r>
-              <a:rPr lang="en-US" baseline="0" dirty="0" smtClean="0"/>
-              <a:t> define, by analyzing existing and add new to fill gaps.</a:t>
-            </a:r>
-            <a:endParaRPr lang="en-IN" dirty="0"/>
-          </a:p>
-        </p:txBody>
-      </p:sp>
-      <p:sp>
-        <p:nvSpPr>
-          <p:cNvPr id="4" name="Header Placeholder 3"/>
-          <p:cNvSpPr>
-            <a:spLocks noGrp="1"/>
-          </p:cNvSpPr>
-          <p:nvPr>
-            <p:ph type="hdr" sz="quarter" idx="10"/>
-          </p:nvPr>
-        </p:nvSpPr>
-        <p:spPr/>
-        <p:txBody>
-          <a:bodyPr/>
-          <a:lstStyle/>
-          <a:p>
-            <a:r>
-              <a:rPr lang="en-US" smtClean="0"/>
               <a:t>PEG</a:t>
             </a:r>
-            <a:endParaRPr lang="en-US"/>
+            <a:endParaRPr lang="en-US" dirty="0"/>
           </a:p>
         </p:txBody>
       </p:sp>
@@ -1045,7 +1012,7 @@
               <a:pPr/>
               <a:t>12</a:t>
             </a:fld>
-            <a:endParaRPr lang="en-US"/>
+            <a:endParaRPr lang="en-US" dirty="0"/>
           </a:p>
         </p:txBody>
       </p:sp>
@@ -1106,56 +1073,30 @@
           <a:bodyPr/>
           <a:lstStyle/>
           <a:p>
+            <a:endParaRPr lang="en-IN" dirty="0"/>
+          </a:p>
+        </p:txBody>
+      </p:sp>
+      <p:sp>
+        <p:nvSpPr>
+          <p:cNvPr id="4" name="Header Placeholder 3"/>
+          <p:cNvSpPr>
+            <a:spLocks noGrp="1"/>
+          </p:cNvSpPr>
+          <p:nvPr>
+            <p:ph type="hdr" sz="quarter" idx="10"/>
+          </p:nvPr>
+        </p:nvSpPr>
+        <p:spPr/>
+        <p:txBody>
+          <a:bodyPr/>
+          <a:lstStyle/>
+          <a:p>
             <a:r>
               <a:rPr lang="en-US" dirty="0" smtClean="0"/>
-              <a:t>OPF SP 1.1 :</a:t>
-            </a:r>
-          </a:p>
-          <a:p>
-            <a:r>
-              <a:rPr lang="en-US" dirty="0" smtClean="0"/>
-              <a:t>PEG formation</a:t>
-            </a:r>
-            <a:r>
-              <a:rPr lang="en-US" baseline="0" dirty="0" smtClean="0"/>
-              <a:t> to identify and improve process needs.</a:t>
-            </a:r>
-          </a:p>
-          <a:p>
-            <a:r>
-              <a:rPr lang="en-US" baseline="0" dirty="0" smtClean="0"/>
-              <a:t>OPF SP 1.2</a:t>
-            </a:r>
-          </a:p>
-          <a:p>
-            <a:r>
-              <a:rPr lang="en-US" baseline="0" dirty="0" smtClean="0"/>
-              <a:t>Sponsorship of the process appraisal from SM.</a:t>
-            </a:r>
-            <a:endParaRPr lang="en-IN" dirty="0"/>
-          </a:p>
-        </p:txBody>
-      </p:sp>
-      <p:sp>
-        <p:nvSpPr>
-          <p:cNvPr id="4" name="Header Placeholder 3"/>
-          <p:cNvSpPr>
-            <a:spLocks noGrp="1"/>
-          </p:cNvSpPr>
-          <p:nvPr>
-            <p:ph type="hdr" sz="quarter" idx="10"/>
-          </p:nvPr>
-        </p:nvSpPr>
-        <p:spPr/>
-        <p:txBody>
-          <a:bodyPr/>
-          <a:lstStyle/>
-          <a:p>
-            <a:r>
-              <a:rPr lang="en-US" smtClean="0"/>
               <a:t>PEG</a:t>
             </a:r>
-            <a:endParaRPr lang="en-US"/>
+            <a:endParaRPr lang="en-US" dirty="0"/>
           </a:p>
         </p:txBody>
       </p:sp>
@@ -1179,7 +1120,7 @@
               <a:pPr/>
               <a:t>2</a:t>
             </a:fld>
-            <a:endParaRPr lang="en-US"/>
+            <a:endParaRPr lang="en-US" dirty="0"/>
           </a:p>
         </p:txBody>
       </p:sp>
@@ -1240,54 +1181,30 @@
           <a:bodyPr/>
           <a:lstStyle/>
           <a:p>
+            <a:endParaRPr lang="en-IN" dirty="0"/>
+          </a:p>
+        </p:txBody>
+      </p:sp>
+      <p:sp>
+        <p:nvSpPr>
+          <p:cNvPr id="4" name="Header Placeholder 3"/>
+          <p:cNvSpPr>
+            <a:spLocks noGrp="1"/>
+          </p:cNvSpPr>
+          <p:nvPr>
+            <p:ph type="hdr" sz="quarter" idx="10"/>
+          </p:nvPr>
+        </p:nvSpPr>
+        <p:spPr/>
+        <p:txBody>
+          <a:bodyPr/>
+          <a:lstStyle/>
+          <a:p>
             <a:r>
               <a:rPr lang="en-US" dirty="0" smtClean="0"/>
-              <a:t>Line rejection percentage is the ratio of total line failures in a month and the total quantity produced in the month.</a:t>
-            </a:r>
-          </a:p>
-          <a:p>
-            <a:r>
-              <a:rPr lang="en-IN" dirty="0" smtClean="0"/>
-              <a:t>Schedule </a:t>
-            </a:r>
-            <a:r>
-              <a:rPr lang="en-IN" dirty="0" smtClean="0"/>
-              <a:t>variance = (Actual Duration – Planned Duration)/Planned Duration</a:t>
-            </a:r>
-          </a:p>
-          <a:p>
-            <a:r>
-              <a:rPr lang="en-IN" dirty="0" smtClean="0"/>
-              <a:t>Efforts Variance = (Actual</a:t>
-            </a:r>
-            <a:r>
-              <a:rPr lang="en-IN" baseline="0" dirty="0" smtClean="0"/>
-              <a:t> efforts-Planned efforts)/Planned efforts</a:t>
-            </a:r>
-            <a:endParaRPr lang="en-IN" dirty="0"/>
-          </a:p>
-        </p:txBody>
-      </p:sp>
-      <p:sp>
-        <p:nvSpPr>
-          <p:cNvPr id="4" name="Header Placeholder 3"/>
-          <p:cNvSpPr>
-            <a:spLocks noGrp="1"/>
-          </p:cNvSpPr>
-          <p:nvPr>
-            <p:ph type="hdr" sz="quarter" idx="10"/>
-          </p:nvPr>
-        </p:nvSpPr>
-        <p:spPr/>
-        <p:txBody>
-          <a:bodyPr/>
-          <a:lstStyle/>
-          <a:p>
-            <a:r>
-              <a:rPr lang="en-US" smtClean="0"/>
               <a:t>PEG</a:t>
             </a:r>
-            <a:endParaRPr lang="en-US"/>
+            <a:endParaRPr lang="en-US" dirty="0"/>
           </a:p>
         </p:txBody>
       </p:sp>
@@ -1311,7 +1228,7 @@
               <a:pPr/>
               <a:t>3</a:t>
             </a:fld>
-            <a:endParaRPr lang="en-US"/>
+            <a:endParaRPr lang="en-US" dirty="0"/>
           </a:p>
         </p:txBody>
       </p:sp>
@@ -1372,22 +1289,6 @@
           <a:bodyPr/>
           <a:lstStyle/>
           <a:p>
-            <a:r>
-              <a:rPr lang="en-IN" dirty="0" smtClean="0"/>
-              <a:t>Budget, Resources,</a:t>
-            </a:r>
-            <a:r>
-              <a:rPr lang="en-IN" baseline="0" dirty="0" smtClean="0"/>
-              <a:t> Responsibilities, Training, </a:t>
-            </a:r>
-            <a:r>
-              <a:rPr lang="en-IN" baseline="0" dirty="0" err="1" smtClean="0"/>
-              <a:t>Configuartion</a:t>
-            </a:r>
-            <a:r>
-              <a:rPr lang="en-IN" baseline="0" dirty="0" smtClean="0"/>
-              <a:t>, Audit, SM Review, Action, Release</a:t>
-            </a:r>
             <a:endParaRPr lang="en-IN" dirty="0"/>
           </a:p>
         </p:txBody>
@@ -1408,10 +1309,10 @@
           <a:lstStyle/>
           <a:p>
             <a:r>
-              <a:rPr lang="en-US" smtClean="0"/>
+              <a:rPr lang="en-US" dirty="0" smtClean="0"/>
               <a:t>PEG</a:t>
             </a:r>
-            <a:endParaRPr lang="en-US"/>
+            <a:endParaRPr lang="en-US" dirty="0"/>
           </a:p>
         </p:txBody>
       </p:sp>
@@ -1435,7 +1336,7 @@
               <a:pPr/>
               <a:t>4</a:t>
             </a:fld>
-            <a:endParaRPr lang="en-US"/>
+            <a:endParaRPr lang="en-US" dirty="0"/>
           </a:p>
         </p:txBody>
       </p:sp>
@@ -1496,44 +1397,30 @@
           <a:bodyPr/>
           <a:lstStyle/>
           <a:p>
-            <a:r>
-              <a:rPr lang="en-IN" dirty="0" smtClean="0"/>
-              <a:t>OPF SP 3.1, 3.2 :</a:t>
-            </a:r>
-          </a:p>
+            <a:endParaRPr lang="en-IN" dirty="0"/>
+          </a:p>
+        </p:txBody>
+      </p:sp>
+      <p:sp>
+        <p:nvSpPr>
+          <p:cNvPr id="4" name="Header Placeholder 3"/>
+          <p:cNvSpPr>
+            <a:spLocks noGrp="1"/>
+          </p:cNvSpPr>
+          <p:nvPr>
+            <p:ph type="hdr" sz="quarter" idx="10"/>
+          </p:nvPr>
+        </p:nvSpPr>
+        <p:spPr/>
+        <p:txBody>
+          <a:bodyPr/>
+          <a:lstStyle/>
           <a:p>
             <a:r>
               <a:rPr lang="en-US" dirty="0" smtClean="0"/>
-              <a:t>Implemented</a:t>
-            </a:r>
-            <a:r>
-              <a:rPr lang="en-US" baseline="0" dirty="0" smtClean="0"/>
-              <a:t> improvements as revise QMS objectively audit.</a:t>
-            </a:r>
-            <a:endParaRPr lang="en-IN" dirty="0"/>
-          </a:p>
-        </p:txBody>
-      </p:sp>
-      <p:sp>
-        <p:nvSpPr>
-          <p:cNvPr id="4" name="Header Placeholder 3"/>
-          <p:cNvSpPr>
-            <a:spLocks noGrp="1"/>
-          </p:cNvSpPr>
-          <p:nvPr>
-            <p:ph type="hdr" sz="quarter" idx="10"/>
-          </p:nvPr>
-        </p:nvSpPr>
-        <p:spPr/>
-        <p:txBody>
-          <a:bodyPr/>
-          <a:lstStyle/>
-          <a:p>
-            <a:r>
-              <a:rPr lang="en-US" smtClean="0"/>
               <a:t>PEG</a:t>
             </a:r>
-            <a:endParaRPr lang="en-US"/>
+            <a:endParaRPr lang="en-US" dirty="0"/>
           </a:p>
         </p:txBody>
       </p:sp>
@@ -1557,7 +1444,7 @@
               <a:pPr/>
               <a:t>6</a:t>
             </a:fld>
-            <a:endParaRPr lang="en-US"/>
+            <a:endParaRPr lang="en-US" dirty="0"/>
           </a:p>
         </p:txBody>
       </p:sp>
@@ -1618,64 +1505,30 @@
           <a:bodyPr/>
           <a:lstStyle/>
           <a:p>
-            <a:r>
-              <a:rPr lang="en-IN" dirty="0" smtClean="0"/>
-              <a:t>OPF SP 1.2 :</a:t>
-            </a:r>
-          </a:p>
-          <a:p>
-            <a:r>
-              <a:rPr lang="en-IN" dirty="0" smtClean="0"/>
-              <a:t>Appraise</a:t>
-            </a:r>
-            <a:r>
-              <a:rPr lang="en-IN" baseline="0" dirty="0" smtClean="0"/>
-              <a:t> the process as </a:t>
-            </a:r>
-            <a:r>
-              <a:rPr lang="en-IN" dirty="0" smtClean="0"/>
-              <a:t>Gap Analysis.</a:t>
-            </a:r>
-          </a:p>
+            <a:endParaRPr lang="en-IN" dirty="0"/>
+          </a:p>
+        </p:txBody>
+      </p:sp>
+      <p:sp>
+        <p:nvSpPr>
+          <p:cNvPr id="4" name="Header Placeholder 3"/>
+          <p:cNvSpPr>
+            <a:spLocks noGrp="1"/>
+          </p:cNvSpPr>
+          <p:nvPr>
+            <p:ph type="hdr" sz="quarter" idx="10"/>
+          </p:nvPr>
+        </p:nvSpPr>
+        <p:spPr/>
+        <p:txBody>
+          <a:bodyPr/>
+          <a:lstStyle/>
           <a:p>
             <a:r>
               <a:rPr lang="en-US" dirty="0" smtClean="0"/>
-              <a:t>OPF SP 3.2 :</a:t>
-            </a:r>
-          </a:p>
-          <a:p>
-            <a:r>
-              <a:rPr lang="en-US" dirty="0" smtClean="0"/>
-              <a:t>Monitor the</a:t>
-            </a:r>
-            <a:r>
-              <a:rPr lang="en-US" baseline="0" dirty="0" smtClean="0"/>
-              <a:t> implementation by review.</a:t>
-            </a:r>
-            <a:endParaRPr lang="en-IN" dirty="0"/>
-          </a:p>
-        </p:txBody>
-      </p:sp>
-      <p:sp>
-        <p:nvSpPr>
-          <p:cNvPr id="4" name="Header Placeholder 3"/>
-          <p:cNvSpPr>
-            <a:spLocks noGrp="1"/>
-          </p:cNvSpPr>
-          <p:nvPr>
-            <p:ph type="hdr" sz="quarter" idx="10"/>
-          </p:nvPr>
-        </p:nvSpPr>
-        <p:spPr/>
-        <p:txBody>
-          <a:bodyPr/>
-          <a:lstStyle/>
-          <a:p>
-            <a:r>
-              <a:rPr lang="en-US" smtClean="0"/>
               <a:t>PEG</a:t>
             </a:r>
-            <a:endParaRPr lang="en-US"/>
+            <a:endParaRPr lang="en-US" dirty="0"/>
           </a:p>
         </p:txBody>
       </p:sp>
@@ -1699,7 +1552,7 @@
               <a:pPr/>
               <a:t>7</a:t>
             </a:fld>
-            <a:endParaRPr lang="en-US"/>
+            <a:endParaRPr lang="en-US" dirty="0"/>
           </a:p>
         </p:txBody>
       </p:sp>
@@ -1760,47 +1613,30 @@
           <a:bodyPr/>
           <a:lstStyle/>
           <a:p>
+            <a:endParaRPr lang="en-IN" dirty="0"/>
+          </a:p>
+        </p:txBody>
+      </p:sp>
+      <p:sp>
+        <p:nvSpPr>
+          <p:cNvPr id="4" name="Header Placeholder 3"/>
+          <p:cNvSpPr>
+            <a:spLocks noGrp="1"/>
+          </p:cNvSpPr>
+          <p:nvPr>
+            <p:ph type="hdr" sz="quarter" idx="10"/>
+          </p:nvPr>
+        </p:nvSpPr>
+        <p:spPr/>
+        <p:txBody>
+          <a:bodyPr/>
+          <a:lstStyle/>
+          <a:p>
             <a:r>
               <a:rPr lang="en-US" dirty="0" smtClean="0"/>
-              <a:t>OPF SP 3.2 :</a:t>
-            </a:r>
-          </a:p>
-          <a:p>
-            <a:r>
-              <a:rPr lang="en-US" dirty="0" smtClean="0"/>
-              <a:t>Monitor the</a:t>
-            </a:r>
-            <a:r>
-              <a:rPr lang="en-US" baseline="0" dirty="0" smtClean="0"/>
-              <a:t> implementation PEG meeting.</a:t>
-            </a:r>
-            <a:endParaRPr lang="en-IN" dirty="0" smtClean="0"/>
-          </a:p>
-          <a:p>
-            <a:endParaRPr lang="en-IN" dirty="0"/>
-          </a:p>
-        </p:txBody>
-      </p:sp>
-      <p:sp>
-        <p:nvSpPr>
-          <p:cNvPr id="4" name="Header Placeholder 3"/>
-          <p:cNvSpPr>
-            <a:spLocks noGrp="1"/>
-          </p:cNvSpPr>
-          <p:nvPr>
-            <p:ph type="hdr" sz="quarter" idx="10"/>
-          </p:nvPr>
-        </p:nvSpPr>
-        <p:spPr/>
-        <p:txBody>
-          <a:bodyPr/>
-          <a:lstStyle/>
-          <a:p>
-            <a:r>
-              <a:rPr lang="en-US" smtClean="0"/>
               <a:t>PEG</a:t>
             </a:r>
-            <a:endParaRPr lang="en-US"/>
+            <a:endParaRPr lang="en-US" dirty="0"/>
           </a:p>
         </p:txBody>
       </p:sp>
@@ -1824,7 +1660,7 @@
               <a:pPr/>
               <a:t>8</a:t>
             </a:fld>
-            <a:endParaRPr lang="en-US"/>
+            <a:endParaRPr lang="en-US" dirty="0"/>
           </a:p>
         </p:txBody>
       </p:sp>
@@ -1905,10 +1741,10 @@
           <a:lstStyle/>
           <a:p>
             <a:r>
-              <a:rPr lang="en-US" smtClean="0"/>
+              <a:rPr lang="en-US" dirty="0" smtClean="0"/>
               <a:t>PEG</a:t>
             </a:r>
-            <a:endParaRPr lang="en-US"/>
+            <a:endParaRPr lang="en-US" dirty="0"/>
           </a:p>
         </p:txBody>
       </p:sp>
@@ -1932,7 +1768,7 @@
               <a:pPr/>
               <a:t>9</a:t>
             </a:fld>
-            <a:endParaRPr lang="en-US"/>
+            <a:endParaRPr lang="en-US" dirty="0"/>
           </a:p>
         </p:txBody>
       </p:sp>
@@ -2013,14 +1849,14 @@
           <a:lstStyle/>
           <a:p>
             <a:r>
-              <a:rPr lang="en-US" smtClean="0">
+              <a:rPr lang="en-US" dirty="0" smtClean="0">
                 <a:solidFill>
                   <a:prstClr val="black"/>
                 </a:solidFill>
               </a:rPr>
               <a:t>PEG</a:t>
             </a:r>
-            <a:endParaRPr lang="en-US">
+            <a:endParaRPr lang="en-US" dirty="0">
               <a:solidFill>
                 <a:prstClr val="black"/>
               </a:solidFill>
@@ -2052,7 +1888,7 @@
               <a:pPr/>
               <a:t>10</a:t>
             </a:fld>
-            <a:endParaRPr lang="en-US">
+            <a:endParaRPr lang="en-US" dirty="0">
               <a:solidFill>
                 <a:prstClr val="black"/>
               </a:solidFill>
@@ -2205,9 +2041,9 @@
             <a:fld id="{3C19CDBB-9E7C-43B1-AF1A-B741A12694CE}" type="datetime1">
               <a:rPr lang="en-US" altLang="en-US" smtClean="0"/>
               <a:pPr/>
-              <a:t>10/28/2022</a:t>
+              <a:t>10/29/2022</a:t>
             </a:fld>
-            <a:endParaRPr lang="en-US" sz="1800">
+            <a:endParaRPr lang="en-US" sz="1800" dirty="0">
               <a:solidFill>
                 <a:schemeClr val="tx1"/>
               </a:solidFill>
@@ -2235,10 +2071,10 @@
           </a:lstStyle>
           <a:p>
             <a:r>
-              <a:rPr lang="en-US" smtClean="0"/>
+              <a:rPr lang="en-US" dirty="0" smtClean="0"/>
               <a:t>PEG</a:t>
             </a:r>
-            <a:endParaRPr lang="en-US"/>
+            <a:endParaRPr lang="en-US" dirty="0"/>
           </a:p>
         </p:txBody>
       </p:sp>
@@ -2266,7 +2102,7 @@
               <a:pPr/>
               <a:t>‹#›</a:t>
             </a:fld>
-            <a:endParaRPr lang="en-US" sz="1800">
+            <a:endParaRPr lang="en-US" sz="1800" dirty="0">
               <a:solidFill>
                 <a:schemeClr val="tx1"/>
               </a:solidFill>
@@ -2401,9 +2237,9 @@
             <a:fld id="{F9DBD1C6-E55A-4163-8539-40BEBF42340A}" type="datetime1">
               <a:rPr lang="en-US" altLang="en-US" smtClean="0"/>
               <a:pPr/>
-              <a:t>10/28/2022</a:t>
+              <a:t>10/29/2022</a:t>
             </a:fld>
-            <a:endParaRPr lang="en-US" sz="1800">
+            <a:endParaRPr lang="en-US" sz="1800" dirty="0">
               <a:solidFill>
                 <a:schemeClr val="tx1"/>
               </a:solidFill>
@@ -2431,10 +2267,10 @@
           </a:lstStyle>
           <a:p>
             <a:r>
-              <a:rPr lang="en-US" smtClean="0"/>
+              <a:rPr lang="en-US" dirty="0" smtClean="0"/>
               <a:t>PEG</a:t>
             </a:r>
-            <a:endParaRPr lang="en-US"/>
+            <a:endParaRPr lang="en-US" dirty="0"/>
           </a:p>
         </p:txBody>
       </p:sp>
@@ -2462,7 +2298,7 @@
               <a:pPr/>
               <a:t>‹#›</a:t>
             </a:fld>
-            <a:endParaRPr lang="en-US" sz="1800">
+            <a:endParaRPr lang="en-US" sz="1800" dirty="0">
               <a:solidFill>
                 <a:schemeClr val="tx1"/>
               </a:solidFill>
@@ -2607,9 +2443,9 @@
             <a:fld id="{BA0F8EB0-2B7B-4E52-A249-D56163E39736}" type="datetime1">
               <a:rPr lang="en-US" altLang="en-US" smtClean="0"/>
               <a:pPr/>
-              <a:t>10/28/2022</a:t>
+              <a:t>10/29/2022</a:t>
             </a:fld>
-            <a:endParaRPr lang="en-US" sz="1800">
+            <a:endParaRPr lang="en-US" sz="1800" dirty="0">
               <a:solidFill>
                 <a:schemeClr val="tx1"/>
               </a:solidFill>
@@ -2637,10 +2473,10 @@
           </a:lstStyle>
           <a:p>
             <a:r>
-              <a:rPr lang="en-US" smtClean="0"/>
+              <a:rPr lang="en-US" dirty="0" smtClean="0"/>
               <a:t>PEG</a:t>
             </a:r>
-            <a:endParaRPr lang="en-US"/>
+            <a:endParaRPr lang="en-US" dirty="0"/>
           </a:p>
         </p:txBody>
       </p:sp>
@@ -2668,7 +2504,7 @@
               <a:pPr/>
               <a:t>‹#›</a:t>
             </a:fld>
-            <a:endParaRPr lang="en-US" sz="1800">
+            <a:endParaRPr lang="en-US" sz="1800" dirty="0">
               <a:solidFill>
                 <a:schemeClr val="tx1"/>
               </a:solidFill>
@@ -2761,9 +2597,9 @@
             <a:fld id="{9083541D-C522-47B7-8138-56B6E302F0F8}" type="datetime1">
               <a:rPr lang="en-US" altLang="en-US" smtClean="0"/>
               <a:pPr/>
-              <a:t>10/28/2022</a:t>
+              <a:t>10/29/2022</a:t>
             </a:fld>
-            <a:endParaRPr lang="en-US" sz="1800">
+            <a:endParaRPr lang="en-US" sz="1800" dirty="0">
               <a:solidFill>
                 <a:schemeClr val="tx1"/>
               </a:solidFill>
@@ -2796,10 +2632,10 @@
           </a:lstStyle>
           <a:p>
             <a:r>
-              <a:rPr lang="en-US" smtClean="0"/>
+              <a:rPr lang="en-US" dirty="0" smtClean="0"/>
               <a:t>PEG</a:t>
             </a:r>
-            <a:endParaRPr lang="en-US"/>
+            <a:endParaRPr lang="en-US" dirty="0"/>
           </a:p>
         </p:txBody>
       </p:sp>
@@ -2832,7 +2668,7 @@
               <a:pPr/>
               <a:t>‹#›</a:t>
             </a:fld>
-            <a:endParaRPr lang="en-US" sz="1800">
+            <a:endParaRPr lang="en-US" sz="1800" dirty="0">
               <a:solidFill>
                 <a:schemeClr val="tx1"/>
               </a:solidFill>
@@ -2967,9 +2803,9 @@
             <a:fld id="{ADF4F9AB-B117-4DFA-BB89-3C4AC1977BB5}" type="datetime1">
               <a:rPr lang="en-US" altLang="en-US" smtClean="0"/>
               <a:pPr/>
-              <a:t>10/28/2022</a:t>
+              <a:t>10/29/2022</a:t>
             </a:fld>
-            <a:endParaRPr lang="en-US" sz="1800">
+            <a:endParaRPr lang="en-US" sz="1800" dirty="0">
               <a:solidFill>
                 <a:schemeClr val="tx1"/>
               </a:solidFill>
@@ -2997,10 +2833,10 @@
           </a:lstStyle>
           <a:p>
             <a:r>
-              <a:rPr lang="en-US" smtClean="0"/>
+              <a:rPr lang="en-US" dirty="0" smtClean="0"/>
               <a:t>PEG</a:t>
             </a:r>
-            <a:endParaRPr lang="en-US"/>
+            <a:endParaRPr lang="en-US" dirty="0"/>
           </a:p>
         </p:txBody>
       </p:sp>
@@ -3028,7 +2864,7 @@
               <a:pPr/>
               <a:t>‹#›</a:t>
             </a:fld>
-            <a:endParaRPr lang="en-US" sz="1800">
+            <a:endParaRPr lang="en-US" sz="1800" dirty="0">
               <a:solidFill>
                 <a:schemeClr val="tx1"/>
               </a:solidFill>
@@ -3185,9 +3021,9 @@
             <a:fld id="{D4F86D22-4210-44E7-AFE7-D0E87EE5B18F}" type="datetime1">
               <a:rPr lang="en-US" altLang="en-US" smtClean="0"/>
               <a:pPr/>
-              <a:t>10/28/2022</a:t>
+              <a:t>10/29/2022</a:t>
             </a:fld>
-            <a:endParaRPr lang="en-US" sz="1800">
+            <a:endParaRPr lang="en-US" sz="1800" dirty="0">
               <a:solidFill>
                 <a:schemeClr val="tx1"/>
               </a:solidFill>
@@ -3215,10 +3051,10 @@
           </a:lstStyle>
           <a:p>
             <a:r>
-              <a:rPr lang="en-US" smtClean="0"/>
+              <a:rPr lang="en-US" dirty="0" smtClean="0"/>
               <a:t>PEG</a:t>
             </a:r>
-            <a:endParaRPr lang="en-US"/>
+            <a:endParaRPr lang="en-US" dirty="0"/>
           </a:p>
         </p:txBody>
       </p:sp>
@@ -3246,7 +3082,7 @@
               <a:pPr/>
               <a:t>‹#›</a:t>
             </a:fld>
-            <a:endParaRPr lang="en-US" sz="1800">
+            <a:endParaRPr lang="en-US" sz="1800" dirty="0">
               <a:solidFill>
                 <a:schemeClr val="tx1"/>
               </a:solidFill>
@@ -3499,9 +3335,9 @@
             <a:fld id="{A2D9298F-64C5-4137-B87A-07B005A2413C}" type="datetime1">
               <a:rPr lang="en-US" altLang="en-US" smtClean="0"/>
               <a:pPr/>
-              <a:t>10/28/2022</a:t>
+              <a:t>10/29/2022</a:t>
             </a:fld>
-            <a:endParaRPr lang="en-US" sz="1800">
+            <a:endParaRPr lang="en-US" sz="1800" dirty="0">
               <a:solidFill>
                 <a:schemeClr val="tx1"/>
               </a:solidFill>
@@ -3529,10 +3365,10 @@
           </a:lstStyle>
           <a:p>
             <a:r>
-              <a:rPr lang="en-US" smtClean="0"/>
+              <a:rPr lang="en-US" dirty="0" smtClean="0"/>
               <a:t>PEG</a:t>
             </a:r>
-            <a:endParaRPr lang="en-US"/>
+            <a:endParaRPr lang="en-US" dirty="0"/>
           </a:p>
         </p:txBody>
       </p:sp>
@@ -3560,7 +3396,7 @@
               <a:pPr/>
               <a:t>‹#›</a:t>
             </a:fld>
-            <a:endParaRPr lang="en-US" sz="1800">
+            <a:endParaRPr lang="en-US" sz="1800" dirty="0">
               <a:solidFill>
                 <a:schemeClr val="tx1"/>
               </a:solidFill>
@@ -3947,9 +3783,9 @@
             <a:fld id="{40047B87-F1CB-43B9-9309-B69AE941F5CB}" type="datetime1">
               <a:rPr lang="en-US" altLang="en-US" smtClean="0"/>
               <a:pPr/>
-              <a:t>10/28/2022</a:t>
+              <a:t>10/29/2022</a:t>
             </a:fld>
-            <a:endParaRPr lang="en-US" sz="1800">
+            <a:endParaRPr lang="en-US" sz="1800" dirty="0">
               <a:solidFill>
                 <a:schemeClr val="tx1"/>
               </a:solidFill>
@@ -3977,10 +3813,10 @@
           </a:lstStyle>
           <a:p>
             <a:r>
-              <a:rPr lang="en-US" smtClean="0"/>
+              <a:rPr lang="en-US" dirty="0" smtClean="0"/>
               <a:t>PEG</a:t>
             </a:r>
-            <a:endParaRPr lang="en-US"/>
+            <a:endParaRPr lang="en-US" dirty="0"/>
           </a:p>
         </p:txBody>
       </p:sp>
@@ -4008,7 +3844,7 @@
               <a:pPr/>
               <a:t>‹#›</a:t>
             </a:fld>
-            <a:endParaRPr lang="en-US" sz="1800">
+            <a:endParaRPr lang="en-US" sz="1800" dirty="0">
               <a:solidFill>
                 <a:schemeClr val="tx1"/>
               </a:solidFill>
@@ -4091,9 +3927,9 @@
             <a:fld id="{B26E4D13-4EA5-423F-8344-114853539E8A}" type="datetime1">
               <a:rPr lang="en-US" altLang="en-US" smtClean="0"/>
               <a:pPr/>
-              <a:t>10/28/2022</a:t>
+              <a:t>10/29/2022</a:t>
             </a:fld>
-            <a:endParaRPr lang="en-US" sz="1800">
+            <a:endParaRPr lang="en-US" sz="1800" dirty="0">
               <a:solidFill>
                 <a:schemeClr val="tx1"/>
               </a:solidFill>
@@ -4121,10 +3957,10 @@
           </a:lstStyle>
           <a:p>
             <a:r>
-              <a:rPr lang="en-US" smtClean="0"/>
+              <a:rPr lang="en-US" dirty="0" smtClean="0"/>
               <a:t>PEG</a:t>
             </a:r>
-            <a:endParaRPr lang="en-US"/>
+            <a:endParaRPr lang="en-US" dirty="0"/>
           </a:p>
         </p:txBody>
       </p:sp>
@@ -4152,7 +3988,7 @@
               <a:pPr/>
               <a:t>‹#›</a:t>
             </a:fld>
-            <a:endParaRPr lang="en-US" sz="1800">
+            <a:endParaRPr lang="en-US" sz="1800" dirty="0">
               <a:solidFill>
                 <a:schemeClr val="tx1"/>
               </a:solidFill>
@@ -4212,9 +4048,9 @@
             <a:fld id="{5B0CD053-2D62-4035-A72B-A5DC0CEC37DF}" type="datetime1">
               <a:rPr lang="en-US" altLang="en-US" smtClean="0"/>
               <a:pPr/>
-              <a:t>10/28/2022</a:t>
+              <a:t>10/29/2022</a:t>
             </a:fld>
-            <a:endParaRPr lang="en-US" sz="1800">
+            <a:endParaRPr lang="en-US" sz="1800" dirty="0">
               <a:solidFill>
                 <a:schemeClr val="tx1"/>
               </a:solidFill>
@@ -4242,10 +4078,10 @@
           </a:lstStyle>
           <a:p>
             <a:r>
-              <a:rPr lang="en-US" smtClean="0"/>
+              <a:rPr lang="en-US" dirty="0" smtClean="0"/>
               <a:t>PEG</a:t>
             </a:r>
-            <a:endParaRPr lang="en-US"/>
+            <a:endParaRPr lang="en-US" dirty="0"/>
           </a:p>
         </p:txBody>
       </p:sp>
@@ -4273,7 +4109,7 @@
               <a:pPr/>
               <a:t>‹#›</a:t>
             </a:fld>
-            <a:endParaRPr lang="en-US" sz="1800">
+            <a:endParaRPr lang="en-US" sz="1800" dirty="0">
               <a:solidFill>
                 <a:schemeClr val="tx1"/>
               </a:solidFill>
@@ -4515,9 +4351,9 @@
             <a:fld id="{C5EB947A-E158-4DD5-8D11-B62C199ACE10}" type="datetime1">
               <a:rPr lang="en-US" altLang="en-US" smtClean="0"/>
               <a:pPr/>
-              <a:t>10/28/2022</a:t>
+              <a:t>10/29/2022</a:t>
             </a:fld>
-            <a:endParaRPr lang="en-US" sz="1800">
+            <a:endParaRPr lang="en-US" sz="1800" dirty="0">
               <a:solidFill>
                 <a:schemeClr val="tx1"/>
               </a:solidFill>
@@ -4545,10 +4381,10 @@
           </a:lstStyle>
           <a:p>
             <a:r>
-              <a:rPr lang="en-US" smtClean="0"/>
+              <a:rPr lang="en-US" dirty="0" smtClean="0"/>
               <a:t>PEG</a:t>
             </a:r>
-            <a:endParaRPr lang="en-US"/>
+            <a:endParaRPr lang="en-US" dirty="0"/>
           </a:p>
         </p:txBody>
       </p:sp>
@@ -4576,7 +4412,7 @@
               <a:pPr/>
               <a:t>‹#›</a:t>
             </a:fld>
-            <a:endParaRPr lang="en-US" sz="1800">
+            <a:endParaRPr lang="en-US" sz="1800" dirty="0">
               <a:solidFill>
                 <a:schemeClr val="tx1"/>
               </a:solidFill>
@@ -4703,7 +4539,7 @@
             </a:lvl9pPr>
           </a:lstStyle>
           <a:p>
-            <a:endParaRPr lang="en-US"/>
+            <a:endParaRPr lang="en-US" dirty="0"/>
           </a:p>
         </p:txBody>
       </p:sp>
@@ -4794,9 +4630,9 @@
             <a:fld id="{2B09D523-FD5E-422A-B169-E5534CFB87E5}" type="datetime1">
               <a:rPr lang="en-US" altLang="en-US" smtClean="0"/>
               <a:pPr/>
-              <a:t>10/28/2022</a:t>
+              <a:t>10/29/2022</a:t>
             </a:fld>
-            <a:endParaRPr lang="en-US" sz="1800">
+            <a:endParaRPr lang="en-US" sz="1800" dirty="0">
               <a:solidFill>
                 <a:schemeClr val="tx1"/>
               </a:solidFill>
@@ -4824,10 +4660,10 @@
           </a:lstStyle>
           <a:p>
             <a:r>
-              <a:rPr lang="en-US" smtClean="0"/>
+              <a:rPr lang="en-US" dirty="0" smtClean="0"/>
               <a:t>PEG</a:t>
             </a:r>
-            <a:endParaRPr lang="en-US"/>
+            <a:endParaRPr lang="en-US" dirty="0"/>
           </a:p>
         </p:txBody>
       </p:sp>
@@ -4855,7 +4691,7 @@
               <a:pPr/>
               <a:t>‹#›</a:t>
             </a:fld>
-            <a:endParaRPr lang="en-US" sz="1800">
+            <a:endParaRPr lang="en-US" sz="1800" dirty="0">
               <a:solidFill>
                 <a:schemeClr val="tx1"/>
               </a:solidFill>
@@ -5118,9 +4954,9 @@
             <a:fld id="{B2CC09BA-DD9E-46BF-93B3-79EEA0849637}" type="datetime1">
               <a:rPr lang="en-US" altLang="en-US" smtClean="0"/>
               <a:pPr/>
-              <a:t>10/28/2022</a:t>
+              <a:t>10/29/2022</a:t>
             </a:fld>
-            <a:endParaRPr lang="en-US" sz="1800">
+            <a:endParaRPr lang="en-US" sz="1800" dirty="0">
               <a:solidFill>
                 <a:schemeClr val="tx1"/>
               </a:solidFill>
@@ -5187,10 +5023,10 @@
           </a:lstStyle>
           <a:p>
             <a:r>
-              <a:rPr lang="en-US" smtClean="0"/>
+              <a:rPr lang="en-US" dirty="0" smtClean="0"/>
               <a:t>PEG</a:t>
             </a:r>
-            <a:endParaRPr lang="en-US"/>
+            <a:endParaRPr lang="en-US" dirty="0"/>
           </a:p>
         </p:txBody>
       </p:sp>
@@ -5257,7 +5093,7 @@
               <a:pPr/>
               <a:t>‹#›</a:t>
             </a:fld>
-            <a:endParaRPr lang="en-US" sz="1800">
+            <a:endParaRPr lang="en-US" sz="1800" dirty="0">
               <a:solidFill>
                 <a:schemeClr val="tx1"/>
               </a:solidFill>
@@ -5772,7 +5608,7 @@
           <a:lstStyle/>
           <a:p>
             <a:r>
-              <a:rPr lang="en-US" smtClean="0"/>
+              <a:rPr lang="en-US" dirty="0" smtClean="0"/>
               <a:t>PEG</a:t>
             </a:r>
             <a:endParaRPr lang="en-US" dirty="0"/>
@@ -5799,7 +5635,7 @@
               <a:pPr/>
               <a:t>1</a:t>
             </a:fld>
-            <a:endParaRPr lang="en-US" sz="1800">
+            <a:endParaRPr lang="en-US" sz="1800" dirty="0">
               <a:solidFill>
                 <a:schemeClr val="tx1"/>
               </a:solidFill>
@@ -6023,19 +5859,7 @@
               <a:rPr lang="en-US" sz="2000" dirty="0" smtClean="0">
                 <a:latin typeface="Arial Rounded MT Bold" pitchFamily="34" charset="0"/>
               </a:rPr>
-              <a:t>Process Engineering Group (</a:t>
-            </a:r>
-            <a:r>
-              <a:rPr lang="en-US" sz="2000" dirty="0" smtClean="0">
-                <a:latin typeface="Arial Rounded MT Bold" pitchFamily="34" charset="0"/>
-              </a:rPr>
-              <a:t>R&amp;D - GIL</a:t>
-            </a:r>
-            <a:r>
-              <a:rPr lang="en-US" sz="2000" dirty="0" smtClean="0">
-                <a:latin typeface="Arial Rounded MT Bold" pitchFamily="34" charset="0"/>
-              </a:rPr>
-              <a:t>)</a:t>
+              <a:t>Process Engineering Group (R&amp;D - GIL)</a:t>
             </a:r>
           </a:p>
         </p:txBody>
@@ -6174,10 +5998,10 @@
           <a:lstStyle/>
           <a:p>
             <a:r>
-              <a:rPr lang="en-US" smtClean="0"/>
+              <a:rPr lang="en-US" dirty="0" smtClean="0"/>
               <a:t>PEG</a:t>
             </a:r>
-            <a:endParaRPr lang="en-US"/>
+            <a:endParaRPr lang="en-US" dirty="0"/>
           </a:p>
         </p:txBody>
       </p:sp>
@@ -6533,7 +6357,17 @@
                   <a:srgbClr val="000000"/>
                 </a:solidFill>
               </a:rPr>
-              <a:t>Ensure data </a:t>
+              <a:t>Ensure data quality</a:t>
+            </a:r>
+          </a:p>
+          <a:p>
+            <a:r>
+              <a:rPr lang="en-US" sz="1400" b="1" dirty="0">
+                <a:solidFill>
+                  <a:srgbClr val="000000"/>
+                </a:solidFill>
+              </a:rPr>
+              <a:t>	For Example </a:t>
             </a:r>
             <a:r>
               <a:rPr lang="en-US" sz="1400" b="1" dirty="0" smtClean="0">
@@ -6541,17 +6375,31 @@
                   <a:srgbClr val="000000"/>
                 </a:solidFill>
               </a:rPr>
-              <a:t>quality</a:t>
-            </a:r>
-          </a:p>
-          <a:p>
+              <a:t>: 1. </a:t>
+            </a:r>
+            <a:r>
+              <a:rPr lang="en-US" sz="1400" b="1" dirty="0" smtClean="0">
+                <a:solidFill>
+                  <a:srgbClr val="000000"/>
+                </a:solidFill>
+              </a:rPr>
+              <a:t>Einframe</a:t>
+            </a:r>
+            <a:r>
+              <a:rPr lang="en-US" sz="1400" b="1" dirty="0" smtClean="0">
+                <a:solidFill>
+                  <a:srgbClr val="000000"/>
+                </a:solidFill>
+              </a:rPr>
+              <a:t> </a:t>
+            </a:r>
             <a:r>
               <a:rPr lang="en-US" sz="1400" b="1" dirty="0">
                 <a:solidFill>
                   <a:srgbClr val="000000"/>
                 </a:solidFill>
               </a:rPr>
-              <a:t>	For Example </a:t>
+              <a:t>Project report used as source to collect and verify the schedule </a:t>
             </a:r>
             <a:r>
               <a:rPr lang="en-US" sz="1400" b="1" dirty="0" smtClean="0">
@@ -6559,23 +6407,7 @@
                   <a:srgbClr val="000000"/>
                 </a:solidFill>
               </a:rPr>
-              <a:t>: 1. </a:t>
-            </a:r>
-            <a:r>
-              <a:rPr lang="en-US" sz="1400" b="1" dirty="0" err="1" smtClean="0">
-                <a:solidFill>
-                  <a:srgbClr val="000000"/>
-                </a:solidFill>
-              </a:rPr>
-              <a:t>Einframe</a:t>
-            </a:r>
-            <a:r>
-              <a:rPr lang="en-US" sz="1400" b="1" dirty="0" smtClean="0">
-                <a:solidFill>
-                  <a:srgbClr val="000000"/>
-                </a:solidFill>
-              </a:rPr>
-              <a:t> </a:t>
+              <a:t>variance </a:t>
             </a:r>
             <a:r>
               <a:rPr lang="en-US" sz="1400" b="1" dirty="0">
@@ -6583,26 +6415,10 @@
                   <a:srgbClr val="000000"/>
                 </a:solidFill>
               </a:rPr>
-              <a:t>Project report used as source to collect and verify the schedule </a:t>
+              <a:t>data. These data verified during each milestone audits by PQA. </a:t>
             </a:r>
             <a:r>
               <a:rPr lang="en-US" sz="1400" b="1" dirty="0" smtClean="0">
-                <a:solidFill>
-                  <a:srgbClr val="000000"/>
-                </a:solidFill>
-              </a:rPr>
-              <a:t>variance </a:t>
-            </a:r>
-            <a:r>
-              <a:rPr lang="en-US" sz="1400" b="1" dirty="0">
-                <a:solidFill>
-                  <a:srgbClr val="000000"/>
-                </a:solidFill>
-              </a:rPr>
-              <a:t>data. These data verified during each milestone audits by PQA. </a:t>
-            </a:r>
-            <a:r>
-              <a:rPr lang="en-US" sz="1400" b="1" dirty="0" err="1" smtClean="0">
                 <a:solidFill>
                   <a:srgbClr val="000000"/>
                 </a:solidFill>
@@ -6642,12 +6458,12 @@
               <a:t>and line rejection </a:t>
             </a:r>
             <a:r>
-              <a:rPr lang="en-US" sz="1400" b="1" dirty="0" err="1">
+              <a:rPr lang="en-US" sz="1400" b="1" dirty="0" smtClean="0">
                 <a:solidFill>
                   <a:srgbClr val="000000"/>
                 </a:solidFill>
               </a:rPr>
-              <a:t>quantites</a:t>
+              <a:t>quantities, </a:t>
             </a:r>
             <a:r>
               <a:rPr lang="en-US" sz="1400" b="1" dirty="0">
@@ -6655,7 +6471,7 @@
                   <a:srgbClr val="000000"/>
                 </a:solidFill>
               </a:rPr>
-              <a:t>, used as tool to collect the data and the QA head verify the data.</a:t>
+              <a:t>used as tool to collect the data and the QA head verify the data.</a:t>
             </a:r>
           </a:p>
           <a:p>
@@ -6684,7 +6500,7 @@
               <a:t>. </a:t>
             </a:r>
             <a:r>
-              <a:rPr lang="en-US" sz="1400" b="1" dirty="0" err="1" smtClean="0">
+              <a:rPr lang="en-US" sz="1400" b="1" dirty="0" smtClean="0">
                 <a:solidFill>
                   <a:srgbClr val="000000"/>
                 </a:solidFill>
@@ -6726,7 +6542,7 @@
               <a:t>Project actual efforts used during next similar project’s efforts estimation activity. </a:t>
             </a:r>
             <a:r>
-              <a:rPr lang="en-US" sz="1400" b="1" dirty="0" err="1" smtClean="0">
+              <a:rPr lang="en-US" sz="1400" b="1" dirty="0" smtClean="0">
                 <a:solidFill>
                   <a:srgbClr val="000000"/>
                 </a:solidFill>
@@ -6922,10 +6738,10 @@
           <a:lstStyle/>
           <a:p>
             <a:r>
-              <a:rPr lang="en-US" smtClean="0"/>
+              <a:rPr lang="en-US" dirty="0" smtClean="0"/>
               <a:t>PEG</a:t>
             </a:r>
-            <a:endParaRPr lang="en-US"/>
+            <a:endParaRPr lang="en-US" dirty="0"/>
           </a:p>
         </p:txBody>
       </p:sp>
@@ -7014,13 +6830,7 @@
               <a:rPr lang="en-US" dirty="0" smtClean="0">
                 <a:latin typeface="+mn-lt"/>
               </a:rPr>
-              <a:t>organization’s </a:t>
-            </a:r>
-            <a:r>
-              <a:rPr lang="en-US" dirty="0" smtClean="0">
-                <a:latin typeface="+mn-lt"/>
-              </a:rPr>
-              <a:t>projects</a:t>
+              <a:t>organization’s projects</a:t>
             </a:r>
             <a:r>
               <a:rPr lang="en-US" dirty="0">
@@ -7115,17 +6925,8 @@
               <a:rPr lang="en-US" dirty="0" smtClean="0">
                 <a:latin typeface="+mn-lt"/>
               </a:rPr>
-              <a:t>received from </a:t>
-            </a:r>
-            <a:r>
-              <a:rPr lang="en-US" dirty="0" smtClean="0">
-                <a:latin typeface="+mn-lt"/>
-              </a:rPr>
-              <a:t>GGE295 DC-DC Converter Project</a:t>
-            </a:r>
-            <a:endParaRPr lang="en-US" dirty="0" smtClean="0">
-              <a:latin typeface="+mn-lt"/>
-            </a:endParaRPr>
+              <a:t>received from GGE295 DC-DC Converter Project</a:t>
+            </a:r>
           </a:p>
           <a:p>
             <a:pPr marL="742950" lvl="1" indent="-285750" algn="just">
@@ -7149,7 +6950,7 @@
               <a:t>one month and matrix report making in first phase is not possible due to unavailability of EVMS data in 3-4 day in </a:t>
             </a:r>
             <a:r>
-              <a:rPr lang="en-US" dirty="0" err="1" smtClean="0"/>
+              <a:rPr lang="en-US" dirty="0" smtClean="0"/>
               <a:t>EinFrame</a:t>
             </a:r>
             <a:r>
@@ -7244,13 +7045,7 @@
               <a:rPr lang="en-US" dirty="0" smtClean="0">
                 <a:latin typeface="+mn-lt"/>
               </a:rPr>
-              <a:t>Tailoring requests approved keeping in mind of Project workflow </a:t>
-            </a:r>
-            <a:r>
-              <a:rPr lang="en-US" dirty="0" smtClean="0">
-                <a:latin typeface="+mn-lt"/>
-              </a:rPr>
-              <a:t>and duration (size) of project.</a:t>
+              <a:t>Tailoring requests approved keeping in mind of Project workflow and duration (size) of project.</a:t>
             </a:r>
             <a:endParaRPr lang="en-US" dirty="0">
               <a:latin typeface="+mn-lt"/>
@@ -7386,10 +7181,10 @@
           <a:lstStyle/>
           <a:p>
             <a:r>
-              <a:rPr lang="en-US" smtClean="0"/>
+              <a:rPr lang="en-US" dirty="0" smtClean="0"/>
               <a:t>PEG</a:t>
             </a:r>
-            <a:endParaRPr lang="en-US"/>
+            <a:endParaRPr lang="en-US" dirty="0"/>
           </a:p>
         </p:txBody>
       </p:sp>
@@ -7650,10 +7445,10 @@
           <a:lstStyle/>
           <a:p>
             <a:r>
-              <a:rPr lang="en-US" smtClean="0"/>
+              <a:rPr lang="en-US" dirty="0" smtClean="0"/>
               <a:t>PEG</a:t>
             </a:r>
-            <a:endParaRPr lang="en-US"/>
+            <a:endParaRPr lang="en-US" dirty="0"/>
           </a:p>
         </p:txBody>
       </p:sp>
@@ -7774,15 +7569,7 @@
             </a:r>
             <a:r>
               <a:rPr lang="en-US" sz="1400" dirty="0" smtClean="0"/>
-              <a:t>projects’ </a:t>
-            </a:r>
-            <a:r>
-              <a:rPr lang="en-US" sz="1400" dirty="0" smtClean="0"/>
-              <a:t>processes </a:t>
-            </a:r>
-            <a:r>
-              <a:rPr lang="en-US" sz="1400" dirty="0" smtClean="0"/>
-              <a:t>and metrics.</a:t>
+              <a:t>projects’ processes and metrics.</a:t>
             </a:r>
             <a:endParaRPr lang="en-US" sz="1400" dirty="0"/>
           </a:p>
@@ -7820,7 +7607,6 @@
               <a:rPr lang="en-US" sz="1400" dirty="0" smtClean="0"/>
               <a:t>Genus Innovation Ltd.</a:t>
             </a:r>
-            <a:endParaRPr lang="en-US" sz="1400" dirty="0" smtClean="0"/>
           </a:p>
           <a:p>
             <a:endParaRPr lang="en-US" sz="1400" b="1" dirty="0" smtClean="0"/>
@@ -7922,10 +7708,10 @@
               <a:t>Project Team Section of PEG Plan in </a:t>
             </a:r>
             <a:r>
-              <a:rPr lang="en-US" sz="1400" i="1" dirty="0" err="1" smtClean="0">
+              <a:rPr lang="en-US" sz="1400" i="1" dirty="0" smtClean="0">
                 <a:hlinkClick r:id="rId5"/>
               </a:rPr>
-              <a:t>EinFram</a:t>
+              <a:t>EinFrame</a:t>
             </a:r>
             <a:r>
               <a:rPr lang="en-US" sz="1400" i="1" dirty="0" smtClean="0">
@@ -8091,7 +7877,7 @@
               <a:t>: </a:t>
             </a:r>
             <a:r>
-              <a:rPr lang="en-IN" sz="1400" dirty="0" err="1" smtClean="0">
+              <a:rPr lang="en-IN" sz="1400" dirty="0" smtClean="0">
                 <a:latin typeface="Arial" pitchFamily="34" charset="0"/>
                 <a:cs typeface="Arial" pitchFamily="34" charset="0"/>
               </a:rPr>
@@ -8122,19 +7908,8 @@
                 <a:latin typeface="Arial" pitchFamily="34" charset="0"/>
                 <a:cs typeface="Arial" pitchFamily="34" charset="0"/>
               </a:rPr>
-              <a:t> </a:t>
-            </a:r>
-            <a:r>
-              <a:rPr lang="en-US" sz="1400" dirty="0">
-                <a:latin typeface="Arial" pitchFamily="34" charset="0"/>
-                <a:cs typeface="Arial" pitchFamily="34" charset="0"/>
-              </a:rPr>
-              <a:t>: </a:t>
-            </a:r>
-            <a:endParaRPr lang="en-US" sz="1400" dirty="0">
-              <a:latin typeface="Arial" pitchFamily="34" charset="0"/>
-              <a:cs typeface="Arial" pitchFamily="34" charset="0"/>
-            </a:endParaRPr>
+              <a:t> : </a:t>
+            </a:r>
           </a:p>
           <a:p>
             <a:pPr marL="0" indent="0">
@@ -8145,28 +7920,7 @@
                 <a:latin typeface="Arial" pitchFamily="34" charset="0"/>
                 <a:cs typeface="Arial" pitchFamily="34" charset="0"/>
               </a:rPr>
-              <a:t>	</a:t>
-            </a:r>
-            <a:r>
-              <a:rPr lang="en-US" sz="1400" dirty="0" smtClean="0">
-                <a:latin typeface="Arial" pitchFamily="34" charset="0"/>
-                <a:cs typeface="Arial" pitchFamily="34" charset="0"/>
-              </a:rPr>
-              <a:t>Business objectives revised according to Business priorities and Vison, </a:t>
-            </a:r>
-            <a:r>
-              <a:rPr lang="en-US" sz="1400" dirty="0" smtClean="0">
-                <a:latin typeface="Arial" pitchFamily="34" charset="0"/>
-                <a:cs typeface="Arial" pitchFamily="34" charset="0"/>
-              </a:rPr>
-              <a:t>MBRs </a:t>
-            </a:r>
-            <a:r>
-              <a:rPr lang="en-US" sz="1400" dirty="0" smtClean="0">
-                <a:latin typeface="Arial" pitchFamily="34" charset="0"/>
-                <a:cs typeface="Arial" pitchFamily="34" charset="0"/>
-              </a:rPr>
-              <a:t>made, </a:t>
+              <a:t>	Business objectives revised according to Business priorities and Vison, MBRs made, </a:t>
             </a:r>
             <a:r>
               <a:rPr lang="en-US" sz="1400" dirty="0">
@@ -8248,14 +8002,7 @@
                 <a:latin typeface="Arial" pitchFamily="34" charset="0"/>
                 <a:cs typeface="Arial" pitchFamily="34" charset="0"/>
               </a:rPr>
-              <a:t>Schedule </a:t>
-            </a:r>
-            <a:r>
-              <a:rPr lang="en-US" sz="1400" dirty="0" smtClean="0">
-                <a:latin typeface="Arial" pitchFamily="34" charset="0"/>
-                <a:cs typeface="Arial" pitchFamily="34" charset="0"/>
-              </a:rPr>
-              <a:t>Variance (Delivery)</a:t>
+              <a:t>Schedule Variance (Delivery)</a:t>
             </a:r>
           </a:p>
           <a:p>
@@ -8302,10 +8049,10 @@
           <a:lstStyle/>
           <a:p>
             <a:r>
-              <a:rPr lang="en-US" smtClean="0"/>
+              <a:rPr lang="en-US" dirty="0" smtClean="0"/>
               <a:t>PEG</a:t>
             </a:r>
-            <a:endParaRPr lang="en-US"/>
+            <a:endParaRPr lang="en-US" dirty="0"/>
           </a:p>
         </p:txBody>
       </p:sp>
@@ -8402,10 +8149,10 @@
           <a:lstStyle/>
           <a:p>
             <a:r>
-              <a:rPr lang="en-US" smtClean="0"/>
+              <a:rPr lang="en-US" dirty="0" smtClean="0"/>
               <a:t>PEG</a:t>
             </a:r>
-            <a:endParaRPr lang="en-US"/>
+            <a:endParaRPr lang="en-US" dirty="0"/>
           </a:p>
         </p:txBody>
       </p:sp>
@@ -8497,16 +8244,12 @@
               <a:t>Resource Plan (SVN, </a:t>
             </a:r>
             <a:r>
-              <a:rPr lang="en-US" sz="1400" dirty="0" err="1" smtClean="0"/>
+              <a:rPr lang="en-US" sz="1400" dirty="0" smtClean="0"/>
               <a:t>EinFrame</a:t>
             </a:r>
             <a:r>
               <a:rPr lang="en-US" sz="1400" dirty="0" smtClean="0"/>
-              <a:t>, MS Office </a:t>
-            </a:r>
-            <a:r>
-              <a:rPr lang="en-US" sz="1400" dirty="0" smtClean="0"/>
-              <a:t>etc.)</a:t>
+              <a:t>, MS Office etc.)</a:t>
             </a:r>
           </a:p>
           <a:p>
@@ -8586,13 +8329,8 @@
             </a:pPr>
             <a:r>
               <a:rPr lang="en-US" sz="1400" dirty="0" smtClean="0"/>
-              <a:t>Monitor and </a:t>
-            </a:r>
-            <a:r>
-              <a:rPr lang="en-US" sz="1400" dirty="0" smtClean="0"/>
-              <a:t>Control</a:t>
-            </a:r>
-            <a:endParaRPr lang="en-US" sz="1400" dirty="0" smtClean="0"/>
+              <a:t>Monitor and Control</a:t>
+            </a:r>
           </a:p>
           <a:p>
             <a:pPr marL="342900" indent="-342900">
@@ -8601,11 +8339,7 @@
             </a:pPr>
             <a:r>
               <a:rPr lang="en-US" sz="1400" dirty="0" smtClean="0"/>
-              <a:t>Action &amp; Release Plan </a:t>
-            </a:r>
-            <a:r>
-              <a:rPr lang="en-US" sz="1400" dirty="0" smtClean="0"/>
-              <a:t>(Project Tasks)</a:t>
+              <a:t>Action &amp; Release Plan (Project Tasks)</a:t>
             </a:r>
             <a:r>
               <a:rPr lang="en-US" sz="1400" b="1" dirty="0" smtClean="0"/>
@@ -8870,10 +8604,10 @@
           <a:lstStyle/>
           <a:p>
             <a:r>
-              <a:rPr lang="en-US" smtClean="0"/>
+              <a:rPr lang="en-US" dirty="0" smtClean="0"/>
               <a:t>PEG</a:t>
             </a:r>
-            <a:endParaRPr lang="en-US"/>
+            <a:endParaRPr lang="en-US" dirty="0"/>
           </a:p>
         </p:txBody>
       </p:sp>
@@ -9163,7 +8897,6 @@
               <a:rPr lang="en-US" sz="1200" dirty="0"/>
               <a:t>)</a:t>
             </a:r>
-            <a:endParaRPr lang="en-US" sz="1200" dirty="0"/>
           </a:p>
           <a:p>
             <a:endParaRPr lang="en-US" sz="1200" b="1" dirty="0" smtClean="0"/>
@@ -9175,21 +8908,16 @@
             </a:r>
             <a:r>
               <a:rPr lang="en-US" sz="1200" dirty="0" smtClean="0"/>
-              <a:t>Project wise various review and testing defects </a:t>
+              <a:t>Project wise various review and testing defects available in Incident Management Report of </a:t>
             </a:r>
             <a:r>
               <a:rPr lang="en-US" sz="1200" dirty="0" smtClean="0"/>
-              <a:t>available in Incident Management Report of </a:t>
-            </a:r>
-            <a:r>
-              <a:rPr lang="en-US" sz="1200" dirty="0" err="1" smtClean="0"/>
               <a:t>EinFrame</a:t>
             </a:r>
             <a:r>
               <a:rPr lang="en-US" sz="1200" dirty="0" smtClean="0"/>
               <a:t>.</a:t>
             </a:r>
-            <a:endParaRPr lang="en-US" sz="1200" dirty="0" smtClean="0"/>
           </a:p>
           <a:p>
             <a:r>
@@ -9303,10 +9031,10 @@
           <a:lstStyle/>
           <a:p>
             <a:r>
-              <a:rPr lang="en-US" smtClean="0"/>
+              <a:rPr lang="en-US" dirty="0" smtClean="0"/>
               <a:t>PEG</a:t>
             </a:r>
-            <a:endParaRPr lang="en-US"/>
+            <a:endParaRPr lang="en-US" dirty="0"/>
           </a:p>
         </p:txBody>
       </p:sp>
@@ -9407,13 +9135,7 @@
               <a:rPr lang="en-US" sz="1400" dirty="0" smtClean="0">
                 <a:hlinkClick r:id="rId6"/>
               </a:rPr>
-              <a:t>QMS </a:t>
-            </a:r>
-            <a:r>
-              <a:rPr lang="en-US" sz="1400" dirty="0" smtClean="0">
-                <a:hlinkClick r:id="rId6"/>
-              </a:rPr>
-              <a:t>4.1_QMSREL</a:t>
+              <a:t>QMS 4.1_QMSREL</a:t>
             </a:r>
             <a:endParaRPr lang="en-US" sz="1400" dirty="0" smtClean="0"/>
           </a:p>
@@ -9447,11 +9169,7 @@
           <a:p>
             <a:r>
               <a:rPr lang="en-US" sz="1400" b="1" dirty="0" smtClean="0"/>
-              <a:t>QMS </a:t>
-            </a:r>
-            <a:r>
-              <a:rPr lang="en-US" sz="1400" b="1" dirty="0" smtClean="0"/>
-              <a:t>Training :</a:t>
+              <a:t>QMS Training :</a:t>
             </a:r>
             <a:r>
               <a:rPr lang="en-US" sz="1400" dirty="0" smtClean="0"/>
@@ -9471,13 +9189,7 @@
               <a:rPr lang="en-US" sz="1400" dirty="0" smtClean="0">
                 <a:hlinkClick r:id="rId8"/>
               </a:rPr>
-              <a:t>QMS </a:t>
-            </a:r>
-            <a:r>
-              <a:rPr lang="en-US" sz="1400" dirty="0" smtClean="0">
-                <a:hlinkClick r:id="rId8"/>
-              </a:rPr>
-              <a:t>4.0_Training</a:t>
+              <a:t>QMS 4.0_Training</a:t>
             </a:r>
             <a:endParaRPr lang="en-US" sz="1400" dirty="0"/>
           </a:p>
@@ -9807,16 +9519,12 @@
               <a:t>Training Report in </a:t>
             </a:r>
             <a:r>
-              <a:rPr lang="en-US" sz="1400" dirty="0" err="1" smtClean="0"/>
+              <a:rPr lang="en-US" sz="1400" dirty="0" smtClean="0"/>
               <a:t>EinFrame</a:t>
             </a:r>
             <a:r>
               <a:rPr lang="en-US" sz="1400" dirty="0" smtClean="0"/>
-              <a:t>.  </a:t>
-            </a:r>
-            <a:r>
-              <a:rPr lang="en-US" sz="1400" dirty="0" smtClean="0"/>
-              <a:t>For </a:t>
+              <a:t>.  For </a:t>
             </a:r>
             <a:r>
               <a:rPr lang="en-US" sz="1400" dirty="0"/>
@@ -9856,23 +9564,15 @@
             </a:r>
             <a:r>
               <a:rPr lang="en-US" sz="1400" dirty="0" smtClean="0"/>
-              <a:t>forward the learnings in Incident learnings </a:t>
+              <a:t>forward the learnings in Incident learnings of </a:t>
             </a:r>
             <a:r>
               <a:rPr lang="en-US" sz="1400" dirty="0" smtClean="0"/>
-              <a:t>of </a:t>
-            </a:r>
-            <a:r>
-              <a:rPr lang="en-US" sz="1400" dirty="0" err="1" smtClean="0"/>
               <a:t>EinFrame</a:t>
             </a:r>
             <a:r>
               <a:rPr lang="en-US" sz="1400" dirty="0" smtClean="0"/>
-              <a:t>. </a:t>
-            </a:r>
-            <a:r>
-              <a:rPr lang="en-US" sz="1400" dirty="0" smtClean="0"/>
-              <a:t>For </a:t>
+              <a:t>. For </a:t>
             </a:r>
             <a:r>
               <a:rPr lang="en-US" sz="1400" dirty="0"/>
@@ -9882,13 +9582,7 @@
               <a:rPr lang="en-US" sz="1400" dirty="0" smtClean="0">
                 <a:hlinkClick r:id="rId8"/>
               </a:rPr>
-              <a:t>Incident </a:t>
-            </a:r>
-            <a:r>
-              <a:rPr lang="en-US" sz="1400" dirty="0" smtClean="0">
-                <a:hlinkClick r:id="rId8"/>
-              </a:rPr>
-              <a:t>Learning</a:t>
+              <a:t>Incident Learning</a:t>
             </a:r>
             <a:r>
               <a:rPr lang="en-US" sz="1400" dirty="0" smtClean="0"/>
@@ -9938,7 +9632,7 @@
               <a:t>Projects Repository in </a:t>
             </a:r>
             <a:r>
-              <a:rPr lang="en-US" sz="1400" dirty="0" err="1" smtClean="0">
+              <a:rPr lang="en-US" sz="1400" dirty="0" smtClean="0">
                 <a:hlinkClick r:id="rId9"/>
               </a:rPr>
               <a:t>EinFrame</a:t>
@@ -9947,7 +9641,6 @@
               <a:rPr lang="en-US" sz="1400" dirty="0" smtClean="0"/>
               <a:t>      </a:t>
             </a:r>
-            <a:endParaRPr lang="en-US" sz="1400" dirty="0" smtClean="0"/>
           </a:p>
           <a:p>
             <a:pPr marL="285750" indent="-285750" algn="just">
@@ -9992,11 +9685,7 @@
             </a:r>
             <a:r>
               <a:rPr lang="en-US" sz="1400" dirty="0" smtClean="0"/>
-              <a:t> IR done by KPMG in </a:t>
-            </a:r>
-            <a:r>
-              <a:rPr lang="en-US" sz="1400" dirty="0" smtClean="0"/>
-              <a:t>August 2022. </a:t>
+              <a:t> IR done by KPMG in August 2022. </a:t>
             </a:r>
             <a:r>
               <a:rPr lang="en-US" sz="1400" dirty="0"/>
@@ -10155,10 +9844,10 @@
           <a:lstStyle/>
           <a:p>
             <a:r>
-              <a:rPr lang="en-US" smtClean="0"/>
+              <a:rPr lang="en-US" dirty="0" smtClean="0"/>
               <a:t>PEG</a:t>
             </a:r>
-            <a:endParaRPr lang="en-US"/>
+            <a:endParaRPr lang="en-US" dirty="0"/>
           </a:p>
         </p:txBody>
       </p:sp>
@@ -10394,10 +10083,10 @@
           <a:lstStyle/>
           <a:p>
             <a:r>
-              <a:rPr lang="en-US" smtClean="0"/>
+              <a:rPr lang="en-US" dirty="0" smtClean="0"/>
               <a:t>PEG</a:t>
             </a:r>
-            <a:endParaRPr lang="en-US"/>
+            <a:endParaRPr lang="en-US" dirty="0"/>
           </a:p>
         </p:txBody>
       </p:sp>
@@ -10456,8 +10145,14 @@
               <a:t>PEG Periodic Team Meetings : </a:t>
             </a:r>
             <a:r>
+              <a:rPr lang="en-US" sz="1400" dirty="0" smtClean="0">
+                <a:hlinkClick r:id="rId5"/>
+              </a:rPr>
+              <a:t>Minutes of Meeting</a:t>
+            </a:r>
+            <a:r>
               <a:rPr lang="en-US" sz="1400" dirty="0" smtClean="0"/>
-              <a:t>Only Single person is in PEG.</a:t>
+              <a:t> (If Required).</a:t>
             </a:r>
             <a:endParaRPr lang="en-US" sz="1400" dirty="0" smtClean="0"/>
           </a:p>
@@ -10487,7 +10182,7 @@
             </a:r>
             <a:r>
               <a:rPr lang="en-US" sz="1400" dirty="0" smtClean="0">
-                <a:hlinkClick r:id="rId5"/>
+                <a:hlinkClick r:id="rId6"/>
               </a:rPr>
               <a:t>PEG Senior Management Review Checklist</a:t>
             </a:r>
@@ -10497,7 +10192,7 @@
             </a:r>
             <a:r>
               <a:rPr lang="en-US" sz="1400" dirty="0" smtClean="0">
-                <a:hlinkClick r:id="rId6"/>
+                <a:hlinkClick r:id="rId5"/>
               </a:rPr>
               <a:t>PEG Senior Management Review and Discussion MOM</a:t>
             </a:r>
@@ -10537,15 +10232,7 @@
           <a:p>
             <a:r>
               <a:rPr lang="en-US" sz="1400" b="1" dirty="0" smtClean="0"/>
-              <a:t>Incident Logged during </a:t>
-            </a:r>
-            <a:r>
-              <a:rPr lang="en-US" sz="1400" b="1" dirty="0" smtClean="0"/>
-              <a:t>PEG Audit </a:t>
-            </a:r>
-            <a:r>
-              <a:rPr lang="en-US" sz="1400" b="1" dirty="0" smtClean="0"/>
-              <a:t>:</a:t>
+              <a:t>Incident Logged during PEG Audit :</a:t>
             </a:r>
           </a:p>
           <a:p>
@@ -12148,21 +11835,6 @@
 </file>
 
 <file path=customXml/item1.xml><?xml version="1.0" encoding="utf-8"?>
-<?mso-contentType ?>
-<FormTemplates xmlns="http://schemas.microsoft.com/sharepoint/v3/contenttype/forms">
-  <Display>DocumentLibraryForm</Display>
-  <Edit>DocumentLibraryForm</Edit>
-  <New>DocumentLibraryForm</New>
-</FormTemplates>
-</file>
-
-<file path=customXml/item2.xml><?xml version="1.0" encoding="utf-8"?>
-<p:properties xmlns:p="http://schemas.microsoft.com/office/2006/metadata/properties" xmlns:xsi="http://www.w3.org/2001/XMLSchema-instance">
-  <documentManagement/>
-</p:properties>
-</file>
-
-<file path=customXml/item3.xml><?xml version="1.0" encoding="utf-8"?>
 <ct:contentTypeSchema xmlns:ct="http://schemas.microsoft.com/office/2006/metadata/contentType" xmlns:ma="http://schemas.microsoft.com/office/2006/metadata/properties/metaAttributes" ct:_="" ma:_="" ma:contentTypeName="Document" ma:contentTypeID="0x01010093F30B4418D0AD4A8853296DD1A957C1" ma:contentTypeVersion="0" ma:contentTypeDescription="Create a new document." ma:contentTypeScope="" ma:versionID="f84ab32646e244427fa683947f643753">
   <xsd:schema xmlns:xsd="http://www.w3.org/2001/XMLSchema" xmlns:p="http://schemas.microsoft.com/office/2006/metadata/properties" targetNamespace="http://schemas.microsoft.com/office/2006/metadata/properties" ma:root="true" ma:fieldsID="4aeb20c0e3442673af7ee10786458764">
     <xsd:element name="properties">
@@ -12211,10 +11883,32 @@
 </ct:contentTypeSchema>
 </file>
 
+<file path=customXml/item2.xml><?xml version="1.0" encoding="utf-8"?>
+<p:properties xmlns:p="http://schemas.microsoft.com/office/2006/metadata/properties" xmlns:xsi="http://www.w3.org/2001/XMLSchema-instance">
+  <documentManagement/>
+</p:properties>
+</file>
+
+<file path=customXml/item3.xml><?xml version="1.0" encoding="utf-8"?>
+<?mso-contentType ?>
+<FormTemplates xmlns="http://schemas.microsoft.com/sharepoint/v3/contenttype/forms">
+  <Display>DocumentLibraryForm</Display>
+  <Edit>DocumentLibraryForm</Edit>
+  <New>DocumentLibraryForm</New>
+</FormTemplates>
+</file>
+
 <file path=customXml/itemProps1.xml><?xml version="1.0" encoding="utf-8"?>
-<ds:datastoreItem xmlns:ds="http://schemas.openxmlformats.org/officeDocument/2006/customXml" ds:itemID="{24D5943E-D87E-40F8-97A5-640E35698203}">
+<ds:datastoreItem xmlns:ds="http://schemas.openxmlformats.org/officeDocument/2006/customXml" ds:itemID="{3495D54B-EFC2-49FD-957C-70DE13BE63FF}">
   <ds:schemaRefs>
-    <ds:schemaRef ds:uri="http://schemas.microsoft.com/sharepoint/v3/contenttype/forms"/>
+    <ds:schemaRef ds:uri="http://schemas.microsoft.com/office/2006/metadata/contentType"/>
+    <ds:schemaRef ds:uri="http://schemas.microsoft.com/office/2006/metadata/properties/metaAttributes"/>
+    <ds:schemaRef ds:uri="http://www.w3.org/2001/XMLSchema"/>
+    <ds:schemaRef ds:uri="http://schemas.microsoft.com/office/2006/metadata/properties"/>
+    <ds:schemaRef ds:uri="http://schemas.openxmlformats.org/package/2006/metadata/core-properties"/>
+    <ds:schemaRef ds:uri="http://purl.org/dc/elements/1.1/"/>
+    <ds:schemaRef ds:uri="http://purl.org/dc/terms/"/>
+    <ds:schemaRef ds:uri="http://schemas.microsoft.com/office/internal/2005/internalDocumentation"/>
   </ds:schemaRefs>
 </ds:datastoreItem>
 </file>
@@ -12234,16 +11928,9 @@
 </file>
 
 <file path=customXml/itemProps3.xml><?xml version="1.0" encoding="utf-8"?>
-<ds:datastoreItem xmlns:ds="http://schemas.openxmlformats.org/officeDocument/2006/customXml" ds:itemID="{3495D54B-EFC2-49FD-957C-70DE13BE63FF}">
+<ds:datastoreItem xmlns:ds="http://schemas.openxmlformats.org/officeDocument/2006/customXml" ds:itemID="{24D5943E-D87E-40F8-97A5-640E35698203}">
   <ds:schemaRefs>
-    <ds:schemaRef ds:uri="http://schemas.microsoft.com/office/2006/metadata/contentType"/>
-    <ds:schemaRef ds:uri="http://schemas.microsoft.com/office/2006/metadata/properties/metaAttributes"/>
-    <ds:schemaRef ds:uri="http://www.w3.org/2001/XMLSchema"/>
-    <ds:schemaRef ds:uri="http://schemas.microsoft.com/office/2006/metadata/properties"/>
-    <ds:schemaRef ds:uri="http://schemas.openxmlformats.org/package/2006/metadata/core-properties"/>
-    <ds:schemaRef ds:uri="http://purl.org/dc/elements/1.1/"/>
-    <ds:schemaRef ds:uri="http://purl.org/dc/terms/"/>
-    <ds:schemaRef ds:uri="http://schemas.microsoft.com/office/internal/2005/internalDocumentation"/>
+    <ds:schemaRef ds:uri="http://schemas.microsoft.com/sharepoint/v3/contenttype/forms"/>
   </ds:schemaRefs>
 </ds:datastoreItem>
 </file>
</xml_diff>

<commit_message>
PEG PPT update for print
</commit_message>
<xml_diff>
--- a/Show & Tell/Process Engineering Group_ppt.pptx
+++ b/Show & Tell/Process Engineering Group_ppt.pptx
@@ -25,7 +25,7 @@
     <p:sldId id="317" r:id="rId16"/>
   </p:sldIdLst>
   <p:sldSz cx="9144000" cy="6858000" type="screen4x3"/>
-  <p:notesSz cx="7104063" cy="10234613"/>
+  <p:notesSz cx="9601200" cy="7315200"/>
   <p:defaultTextStyle>
     <a:defPPr>
       <a:defRPr lang="zh-CN"/>
@@ -193,8 +193,8 @@
         </p:nvSpPr>
         <p:spPr>
           <a:xfrm>
-            <a:off x="1" y="0"/>
-            <a:ext cx="3078095" cy="511075"/>
+            <a:off x="1" y="1"/>
+            <a:ext cx="4160071" cy="365291"/>
           </a:xfrm>
           <a:prstGeom prst="rect">
             <a:avLst/>
@@ -228,8 +228,8 @@
         </p:nvSpPr>
         <p:spPr>
           <a:xfrm>
-            <a:off x="4024306" y="0"/>
-            <a:ext cx="3078095" cy="511075"/>
+            <a:off x="5438883" y="1"/>
+            <a:ext cx="4160071" cy="365291"/>
           </a:xfrm>
           <a:prstGeom prst="rect">
             <a:avLst/>
@@ -246,7 +246,7 @@
             <a:fld id="{28B68012-8E42-4A1D-B48A-D791EB074016}" type="datetimeFigureOut">
               <a:rPr lang="en-US" smtClean="0"/>
               <a:pPr/>
-              <a:t>10/29/2022</a:t>
+              <a:t>10/31/2022</a:t>
             </a:fld>
             <a:endParaRPr lang="en-US" dirty="0"/>
           </a:p>
@@ -264,8 +264,8 @@
         </p:nvSpPr>
         <p:spPr>
           <a:xfrm>
-            <a:off x="1" y="9721900"/>
-            <a:ext cx="3078095" cy="511075"/>
+            <a:off x="1" y="6948739"/>
+            <a:ext cx="4160071" cy="365291"/>
           </a:xfrm>
           <a:prstGeom prst="rect">
             <a:avLst/>
@@ -295,8 +295,8 @@
         </p:nvSpPr>
         <p:spPr>
           <a:xfrm>
-            <a:off x="4024306" y="9721900"/>
-            <a:ext cx="3078095" cy="511075"/>
+            <a:off x="5438883" y="6948739"/>
+            <a:ext cx="4160071" cy="365291"/>
           </a:xfrm>
           <a:prstGeom prst="rect">
             <a:avLst/>
@@ -365,8 +365,8 @@
         </p:nvSpPr>
         <p:spPr>
           <a:xfrm>
-            <a:off x="0" y="0"/>
-            <a:ext cx="3078427" cy="511731"/>
+            <a:off x="0" y="1"/>
+            <a:ext cx="4160520" cy="365760"/>
           </a:xfrm>
           <a:prstGeom prst="rect">
             <a:avLst/>
@@ -400,8 +400,8 @@
         </p:nvSpPr>
         <p:spPr>
           <a:xfrm>
-            <a:off x="4023992" y="0"/>
-            <a:ext cx="3078427" cy="511731"/>
+            <a:off x="5438459" y="1"/>
+            <a:ext cx="4160520" cy="365760"/>
           </a:xfrm>
           <a:prstGeom prst="rect">
             <a:avLst/>
@@ -418,7 +418,7 @@
             <a:fld id="{C9D77161-5417-4A31-87B2-69C7C906B48B}" type="datetimeFigureOut">
               <a:rPr lang="en-US" smtClean="0"/>
               <a:pPr/>
-              <a:t>10/29/2022</a:t>
+              <a:t>10/31/2022</a:t>
             </a:fld>
             <a:endParaRPr lang="en-US" dirty="0"/>
           </a:p>
@@ -436,8 +436,8 @@
         </p:nvSpPr>
         <p:spPr>
           <a:xfrm>
-            <a:off x="992188" y="768350"/>
-            <a:ext cx="5119687" cy="3838575"/>
+            <a:off x="2971800" y="549275"/>
+            <a:ext cx="3657600" cy="2743200"/>
           </a:xfrm>
           <a:prstGeom prst="rect">
             <a:avLst/>
@@ -469,8 +469,8 @@
         </p:nvSpPr>
         <p:spPr>
           <a:xfrm>
-            <a:off x="710407" y="4861442"/>
-            <a:ext cx="5683250" cy="4605576"/>
+            <a:off x="960121" y="3474721"/>
+            <a:ext cx="7680960" cy="3291840"/>
           </a:xfrm>
           <a:prstGeom prst="rect">
             <a:avLst/>
@@ -529,8 +529,8 @@
         </p:nvSpPr>
         <p:spPr>
           <a:xfrm>
-            <a:off x="0" y="9721107"/>
-            <a:ext cx="3078427" cy="511731"/>
+            <a:off x="0" y="6948171"/>
+            <a:ext cx="4160520" cy="365760"/>
           </a:xfrm>
           <a:prstGeom prst="rect">
             <a:avLst/>
@@ -560,8 +560,8 @@
         </p:nvSpPr>
         <p:spPr>
           <a:xfrm>
-            <a:off x="4023992" y="9721107"/>
-            <a:ext cx="3078427" cy="511731"/>
+            <a:off x="5438459" y="6948171"/>
+            <a:ext cx="4160520" cy="365760"/>
           </a:xfrm>
           <a:prstGeom prst="rect">
             <a:avLst/>
@@ -2041,7 +2041,7 @@
             <a:fld id="{3C19CDBB-9E7C-43B1-AF1A-B741A12694CE}" type="datetime1">
               <a:rPr lang="en-US" altLang="en-US" smtClean="0"/>
               <a:pPr/>
-              <a:t>10/29/2022</a:t>
+              <a:t>10/31/2022</a:t>
             </a:fld>
             <a:endParaRPr lang="en-US" sz="1800" dirty="0">
               <a:solidFill>
@@ -2237,7 +2237,7 @@
             <a:fld id="{F9DBD1C6-E55A-4163-8539-40BEBF42340A}" type="datetime1">
               <a:rPr lang="en-US" altLang="en-US" smtClean="0"/>
               <a:pPr/>
-              <a:t>10/29/2022</a:t>
+              <a:t>10/31/2022</a:t>
             </a:fld>
             <a:endParaRPr lang="en-US" sz="1800" dirty="0">
               <a:solidFill>
@@ -2443,7 +2443,7 @@
             <a:fld id="{BA0F8EB0-2B7B-4E52-A249-D56163E39736}" type="datetime1">
               <a:rPr lang="en-US" altLang="en-US" smtClean="0"/>
               <a:pPr/>
-              <a:t>10/29/2022</a:t>
+              <a:t>10/31/2022</a:t>
             </a:fld>
             <a:endParaRPr lang="en-US" sz="1800" dirty="0">
               <a:solidFill>
@@ -2597,7 +2597,7 @@
             <a:fld id="{9083541D-C522-47B7-8138-56B6E302F0F8}" type="datetime1">
               <a:rPr lang="en-US" altLang="en-US" smtClean="0"/>
               <a:pPr/>
-              <a:t>10/29/2022</a:t>
+              <a:t>10/31/2022</a:t>
             </a:fld>
             <a:endParaRPr lang="en-US" sz="1800" dirty="0">
               <a:solidFill>
@@ -2803,7 +2803,7 @@
             <a:fld id="{ADF4F9AB-B117-4DFA-BB89-3C4AC1977BB5}" type="datetime1">
               <a:rPr lang="en-US" altLang="en-US" smtClean="0"/>
               <a:pPr/>
-              <a:t>10/29/2022</a:t>
+              <a:t>10/31/2022</a:t>
             </a:fld>
             <a:endParaRPr lang="en-US" sz="1800" dirty="0">
               <a:solidFill>
@@ -3021,7 +3021,7 @@
             <a:fld id="{D4F86D22-4210-44E7-AFE7-D0E87EE5B18F}" type="datetime1">
               <a:rPr lang="en-US" altLang="en-US" smtClean="0"/>
               <a:pPr/>
-              <a:t>10/29/2022</a:t>
+              <a:t>10/31/2022</a:t>
             </a:fld>
             <a:endParaRPr lang="en-US" sz="1800" dirty="0">
               <a:solidFill>
@@ -3335,7 +3335,7 @@
             <a:fld id="{A2D9298F-64C5-4137-B87A-07B005A2413C}" type="datetime1">
               <a:rPr lang="en-US" altLang="en-US" smtClean="0"/>
               <a:pPr/>
-              <a:t>10/29/2022</a:t>
+              <a:t>10/31/2022</a:t>
             </a:fld>
             <a:endParaRPr lang="en-US" sz="1800" dirty="0">
               <a:solidFill>
@@ -3783,7 +3783,7 @@
             <a:fld id="{40047B87-F1CB-43B9-9309-B69AE941F5CB}" type="datetime1">
               <a:rPr lang="en-US" altLang="en-US" smtClean="0"/>
               <a:pPr/>
-              <a:t>10/29/2022</a:t>
+              <a:t>10/31/2022</a:t>
             </a:fld>
             <a:endParaRPr lang="en-US" sz="1800" dirty="0">
               <a:solidFill>
@@ -3927,7 +3927,7 @@
             <a:fld id="{B26E4D13-4EA5-423F-8344-114853539E8A}" type="datetime1">
               <a:rPr lang="en-US" altLang="en-US" smtClean="0"/>
               <a:pPr/>
-              <a:t>10/29/2022</a:t>
+              <a:t>10/31/2022</a:t>
             </a:fld>
             <a:endParaRPr lang="en-US" sz="1800" dirty="0">
               <a:solidFill>
@@ -4048,7 +4048,7 @@
             <a:fld id="{5B0CD053-2D62-4035-A72B-A5DC0CEC37DF}" type="datetime1">
               <a:rPr lang="en-US" altLang="en-US" smtClean="0"/>
               <a:pPr/>
-              <a:t>10/29/2022</a:t>
+              <a:t>10/31/2022</a:t>
             </a:fld>
             <a:endParaRPr lang="en-US" sz="1800" dirty="0">
               <a:solidFill>
@@ -4351,7 +4351,7 @@
             <a:fld id="{C5EB947A-E158-4DD5-8D11-B62C199ACE10}" type="datetime1">
               <a:rPr lang="en-US" altLang="en-US" smtClean="0"/>
               <a:pPr/>
-              <a:t>10/29/2022</a:t>
+              <a:t>10/31/2022</a:t>
             </a:fld>
             <a:endParaRPr lang="en-US" sz="1800" dirty="0">
               <a:solidFill>
@@ -4630,7 +4630,7 @@
             <a:fld id="{2B09D523-FD5E-422A-B169-E5534CFB87E5}" type="datetime1">
               <a:rPr lang="en-US" altLang="en-US" smtClean="0"/>
               <a:pPr/>
-              <a:t>10/29/2022</a:t>
+              <a:t>10/31/2022</a:t>
             </a:fld>
             <a:endParaRPr lang="en-US" sz="1800" dirty="0">
               <a:solidFill>
@@ -4954,7 +4954,7 @@
             <a:fld id="{B2CC09BA-DD9E-46BF-93B3-79EEA0849637}" type="datetime1">
               <a:rPr lang="en-US" altLang="en-US" smtClean="0"/>
               <a:pPr/>
-              <a:t>10/29/2022</a:t>
+              <a:t>10/31/2022</a:t>
             </a:fld>
             <a:endParaRPr lang="en-US" sz="1800" dirty="0">
               <a:solidFill>
@@ -6375,23 +6375,7 @@
                   <a:srgbClr val="000000"/>
                 </a:solidFill>
               </a:rPr>
-              <a:t>: 1. </a:t>
-            </a:r>
-            <a:r>
-              <a:rPr lang="en-US" sz="1400" b="1" dirty="0" smtClean="0">
-                <a:solidFill>
-                  <a:srgbClr val="000000"/>
-                </a:solidFill>
-              </a:rPr>
-              <a:t>Einframe</a:t>
-            </a:r>
-            <a:r>
-              <a:rPr lang="en-US" sz="1400" b="1" dirty="0" smtClean="0">
-                <a:solidFill>
-                  <a:srgbClr val="000000"/>
-                </a:solidFill>
-              </a:rPr>
-              <a:t> </a:t>
+              <a:t>: 1. Einframe </a:t>
             </a:r>
             <a:r>
               <a:rPr lang="en-US" sz="1400" b="1" dirty="0">
@@ -6951,11 +6935,7 @@
             </a:r>
             <a:r>
               <a:rPr lang="en-US" dirty="0" smtClean="0"/>
-              <a:t>EinFrame</a:t>
-            </a:r>
-            <a:r>
-              <a:rPr lang="en-US" dirty="0" smtClean="0"/>
-              <a:t>.</a:t>
+              <a:t>EinFrame.</a:t>
             </a:r>
             <a:endParaRPr lang="en-US" dirty="0" smtClean="0">
               <a:latin typeface="+mn-lt"/>
@@ -7705,19 +7685,7 @@
               <a:rPr lang="en-US" sz="1400" i="1" dirty="0" smtClean="0">
                 <a:hlinkClick r:id="rId5"/>
               </a:rPr>
-              <a:t>Project Team Section of PEG Plan in </a:t>
-            </a:r>
-            <a:r>
-              <a:rPr lang="en-US" sz="1400" i="1" dirty="0" smtClean="0">
-                <a:hlinkClick r:id="rId5"/>
-              </a:rPr>
-              <a:t>EinFrame</a:t>
-            </a:r>
-            <a:r>
-              <a:rPr lang="en-US" sz="1400" i="1" dirty="0" smtClean="0">
-                <a:hlinkClick r:id="rId5"/>
-              </a:rPr>
-              <a:t>.</a:t>
+              <a:t>Project Team Section of PEG Plan in EinFrame.</a:t>
             </a:r>
             <a:endParaRPr lang="en-US" sz="1400" i="1" dirty="0"/>
           </a:p>
@@ -7881,14 +7849,7 @@
                 <a:latin typeface="Arial" pitchFamily="34" charset="0"/>
                 <a:cs typeface="Arial" pitchFamily="34" charset="0"/>
               </a:rPr>
-              <a:t>EinFrame</a:t>
-            </a:r>
-            <a:r>
-              <a:rPr lang="en-IN" sz="1400" dirty="0" smtClean="0">
-                <a:latin typeface="Arial" pitchFamily="34" charset="0"/>
-                <a:cs typeface="Arial" pitchFamily="34" charset="0"/>
-              </a:rPr>
-              <a:t> as tool implemented for Project Management activities..</a:t>
+              <a:t>EinFrame as tool implemented for Project Management activities..</a:t>
             </a:r>
             <a:endParaRPr lang="en-US" sz="1400" dirty="0">
               <a:latin typeface="Arial" pitchFamily="34" charset="0"/>
@@ -8241,15 +8202,7 @@
             </a:pPr>
             <a:r>
               <a:rPr lang="en-US" sz="1400" dirty="0" smtClean="0"/>
-              <a:t>Resource Plan (SVN, </a:t>
-            </a:r>
-            <a:r>
-              <a:rPr lang="en-US" sz="1400" dirty="0" smtClean="0"/>
-              <a:t>EinFrame</a:t>
-            </a:r>
-            <a:r>
-              <a:rPr lang="en-US" sz="1400" dirty="0" smtClean="0"/>
-              <a:t>, MS Office etc.)</a:t>
+              <a:t>Resource Plan (SVN, EinFrame, MS Office etc.)</a:t>
             </a:r>
           </a:p>
           <a:p>
@@ -8908,15 +8861,7 @@
             </a:r>
             <a:r>
               <a:rPr lang="en-US" sz="1200" dirty="0" smtClean="0"/>
-              <a:t>Project wise various review and testing defects available in Incident Management Report of </a:t>
-            </a:r>
-            <a:r>
-              <a:rPr lang="en-US" sz="1200" dirty="0" smtClean="0"/>
-              <a:t>EinFrame</a:t>
-            </a:r>
-            <a:r>
-              <a:rPr lang="en-US" sz="1200" dirty="0" smtClean="0"/>
-              <a:t>.</a:t>
+              <a:t>Project wise various review and testing defects available in Incident Management Report of EinFrame.</a:t>
             </a:r>
           </a:p>
           <a:p>
@@ -9516,15 +9461,7 @@
             </a:r>
             <a:r>
               <a:rPr lang="en-US" sz="1400" dirty="0" smtClean="0"/>
-              <a:t>Training Report in </a:t>
-            </a:r>
-            <a:r>
-              <a:rPr lang="en-US" sz="1400" dirty="0" smtClean="0"/>
-              <a:t>EinFrame</a:t>
-            </a:r>
-            <a:r>
-              <a:rPr lang="en-US" sz="1400" dirty="0" smtClean="0"/>
-              <a:t>.  For </a:t>
+              <a:t>Training Report in EinFrame.  For </a:t>
             </a:r>
             <a:r>
               <a:rPr lang="en-US" sz="1400" dirty="0"/>
@@ -9564,15 +9501,7 @@
             </a:r>
             <a:r>
               <a:rPr lang="en-US" sz="1400" dirty="0" smtClean="0"/>
-              <a:t>forward the learnings in Incident learnings of </a:t>
-            </a:r>
-            <a:r>
-              <a:rPr lang="en-US" sz="1400" dirty="0" smtClean="0"/>
-              <a:t>EinFrame</a:t>
-            </a:r>
-            <a:r>
-              <a:rPr lang="en-US" sz="1400" dirty="0" smtClean="0"/>
-              <a:t>. For </a:t>
+              <a:t>forward the learnings in Incident learnings of EinFrame. For </a:t>
             </a:r>
             <a:r>
               <a:rPr lang="en-US" sz="1400" dirty="0"/>
@@ -9629,13 +9558,7 @@
               <a:rPr lang="en-US" sz="1400" dirty="0" smtClean="0">
                 <a:hlinkClick r:id="rId9"/>
               </a:rPr>
-              <a:t>Projects Repository in </a:t>
-            </a:r>
-            <a:r>
-              <a:rPr lang="en-US" sz="1400" dirty="0" smtClean="0">
-                <a:hlinkClick r:id="rId9"/>
-              </a:rPr>
-              <a:t>EinFrame</a:t>
+              <a:t>Projects Repository in EinFrame</a:t>
             </a:r>
             <a:r>
               <a:rPr lang="en-US" sz="1400" dirty="0" smtClean="0"/>
@@ -10154,7 +10077,6 @@
               <a:rPr lang="en-US" sz="1400" dirty="0" smtClean="0"/>
               <a:t> (If Required).</a:t>
             </a:r>
-            <a:endParaRPr lang="en-US" sz="1400" dirty="0" smtClean="0"/>
           </a:p>
           <a:p>
             <a:endParaRPr lang="en-US" sz="1400" dirty="0" smtClean="0"/>
@@ -11835,6 +11757,21 @@
 </file>
 
 <file path=customXml/item1.xml><?xml version="1.0" encoding="utf-8"?>
+<?mso-contentType ?>
+<FormTemplates xmlns="http://schemas.microsoft.com/sharepoint/v3/contenttype/forms">
+  <Display>DocumentLibraryForm</Display>
+  <Edit>DocumentLibraryForm</Edit>
+  <New>DocumentLibraryForm</New>
+</FormTemplates>
+</file>
+
+<file path=customXml/item2.xml><?xml version="1.0" encoding="utf-8"?>
+<p:properties xmlns:p="http://schemas.microsoft.com/office/2006/metadata/properties" xmlns:xsi="http://www.w3.org/2001/XMLSchema-instance">
+  <documentManagement/>
+</p:properties>
+</file>
+
+<file path=customXml/item3.xml><?xml version="1.0" encoding="utf-8"?>
 <ct:contentTypeSchema xmlns:ct="http://schemas.microsoft.com/office/2006/metadata/contentType" xmlns:ma="http://schemas.microsoft.com/office/2006/metadata/properties/metaAttributes" ct:_="" ma:_="" ma:contentTypeName="Document" ma:contentTypeID="0x01010093F30B4418D0AD4A8853296DD1A957C1" ma:contentTypeVersion="0" ma:contentTypeDescription="Create a new document." ma:contentTypeScope="" ma:versionID="f84ab32646e244427fa683947f643753">
   <xsd:schema xmlns:xsd="http://www.w3.org/2001/XMLSchema" xmlns:p="http://schemas.microsoft.com/office/2006/metadata/properties" targetNamespace="http://schemas.microsoft.com/office/2006/metadata/properties" ma:root="true" ma:fieldsID="4aeb20c0e3442673af7ee10786458764">
     <xsd:element name="properties">
@@ -11883,22 +11820,29 @@
 </ct:contentTypeSchema>
 </file>
 
-<file path=customXml/item2.xml><?xml version="1.0" encoding="utf-8"?>
-<p:properties xmlns:p="http://schemas.microsoft.com/office/2006/metadata/properties" xmlns:xsi="http://www.w3.org/2001/XMLSchema-instance">
-  <documentManagement/>
-</p:properties>
+<file path=customXml/itemProps1.xml><?xml version="1.0" encoding="utf-8"?>
+<ds:datastoreItem xmlns:ds="http://schemas.openxmlformats.org/officeDocument/2006/customXml" ds:itemID="{24D5943E-D87E-40F8-97A5-640E35698203}">
+  <ds:schemaRefs>
+    <ds:schemaRef ds:uri="http://schemas.microsoft.com/sharepoint/v3/contenttype/forms"/>
+  </ds:schemaRefs>
+</ds:datastoreItem>
 </file>
 
-<file path=customXml/item3.xml><?xml version="1.0" encoding="utf-8"?>
-<?mso-contentType ?>
-<FormTemplates xmlns="http://schemas.microsoft.com/sharepoint/v3/contenttype/forms">
-  <Display>DocumentLibraryForm</Display>
-  <Edit>DocumentLibraryForm</Edit>
-  <New>DocumentLibraryForm</New>
-</FormTemplates>
+<file path=customXml/itemProps2.xml><?xml version="1.0" encoding="utf-8"?>
+<ds:datastoreItem xmlns:ds="http://schemas.openxmlformats.org/officeDocument/2006/customXml" ds:itemID="{F908E215-9F61-4601-9A70-B6C4D02671DF}">
+  <ds:schemaRefs>
+    <ds:schemaRef ds:uri="http://purl.org/dc/elements/1.1/"/>
+    <ds:schemaRef ds:uri="http://schemas.microsoft.com/office/2006/documentManagement/types"/>
+    <ds:schemaRef ds:uri="http://purl.org/dc/dcmitype/"/>
+    <ds:schemaRef ds:uri="http://www.w3.org/XML/1998/namespace"/>
+    <ds:schemaRef ds:uri="http://schemas.openxmlformats.org/package/2006/metadata/core-properties"/>
+    <ds:schemaRef ds:uri="http://purl.org/dc/terms/"/>
+    <ds:schemaRef ds:uri="http://schemas.microsoft.com/office/2006/metadata/properties"/>
+  </ds:schemaRefs>
+</ds:datastoreItem>
 </file>
 
-<file path=customXml/itemProps1.xml><?xml version="1.0" encoding="utf-8"?>
+<file path=customXml/itemProps3.xml><?xml version="1.0" encoding="utf-8"?>
 <ds:datastoreItem xmlns:ds="http://schemas.openxmlformats.org/officeDocument/2006/customXml" ds:itemID="{3495D54B-EFC2-49FD-957C-70DE13BE63FF}">
   <ds:schemaRefs>
     <ds:schemaRef ds:uri="http://schemas.microsoft.com/office/2006/metadata/contentType"/>
@@ -11911,26 +11855,4 @@
     <ds:schemaRef ds:uri="http://schemas.microsoft.com/office/internal/2005/internalDocumentation"/>
   </ds:schemaRefs>
 </ds:datastoreItem>
-</file>
-
-<file path=customXml/itemProps2.xml><?xml version="1.0" encoding="utf-8"?>
-<ds:datastoreItem xmlns:ds="http://schemas.openxmlformats.org/officeDocument/2006/customXml" ds:itemID="{F908E215-9F61-4601-9A70-B6C4D02671DF}">
-  <ds:schemaRefs>
-    <ds:schemaRef ds:uri="http://purl.org/dc/terms/"/>
-    <ds:schemaRef ds:uri="http://schemas.openxmlformats.org/package/2006/metadata/core-properties"/>
-    <ds:schemaRef ds:uri="http://schemas.microsoft.com/office/2006/documentManagement/types"/>
-    <ds:schemaRef ds:uri="http://purl.org/dc/elements/1.1/"/>
-    <ds:schemaRef ds:uri="http://schemas.microsoft.com/office/2006/metadata/properties"/>
-    <ds:schemaRef ds:uri="http://www.w3.org/XML/1998/namespace"/>
-    <ds:schemaRef ds:uri="http://purl.org/dc/dcmitype/"/>
-  </ds:schemaRefs>
-</ds:datastoreItem>
-</file>
-
-<file path=customXml/itemProps3.xml><?xml version="1.0" encoding="utf-8"?>
-<ds:datastoreItem xmlns:ds="http://schemas.openxmlformats.org/officeDocument/2006/customXml" ds:itemID="{24D5943E-D87E-40F8-97A5-640E35698203}">
-  <ds:schemaRefs>
-    <ds:schemaRef ds:uri="http://schemas.microsoft.com/sharepoint/v3/contenttype/forms"/>
-  </ds:schemaRefs>
-</ds:datastoreItem>
 </file>
</xml_diff>